<commit_message>
increased text size in background-subtraction-model.pdf
</commit_message>
<xml_diff>
--- a/images/support.pptx
+++ b/images/support.pptx
@@ -205,7 +205,7 @@
           <a:p>
             <a:fld id="{C1FFD92D-F991-483E-B5E8-A24C276DA1FE}" type="datetimeFigureOut">
               <a:rPr lang="en-US" smtClean="0"/>
-              <a:t>9/9/2019</a:t>
+              <a:t>9/10/2019</a:t>
             </a:fld>
             <a:endParaRPr lang="en-US"/>
           </a:p>
@@ -1171,7 +1171,7 @@
           <a:p>
             <a:fld id="{65784E94-7368-4993-AD91-D3A3EC152C53}" type="datetimeFigureOut">
               <a:rPr lang="en-US" smtClean="0"/>
-              <a:t>9/9/2019</a:t>
+              <a:t>9/10/2019</a:t>
             </a:fld>
             <a:endParaRPr lang="en-US"/>
           </a:p>
@@ -1341,7 +1341,7 @@
           <a:p>
             <a:fld id="{65784E94-7368-4993-AD91-D3A3EC152C53}" type="datetimeFigureOut">
               <a:rPr lang="en-US" smtClean="0"/>
-              <a:t>9/9/2019</a:t>
+              <a:t>9/10/2019</a:t>
             </a:fld>
             <a:endParaRPr lang="en-US"/>
           </a:p>
@@ -1521,7 +1521,7 @@
           <a:p>
             <a:fld id="{65784E94-7368-4993-AD91-D3A3EC152C53}" type="datetimeFigureOut">
               <a:rPr lang="en-US" smtClean="0"/>
-              <a:t>9/9/2019</a:t>
+              <a:t>9/10/2019</a:t>
             </a:fld>
             <a:endParaRPr lang="en-US"/>
           </a:p>
@@ -1691,7 +1691,7 @@
           <a:p>
             <a:fld id="{65784E94-7368-4993-AD91-D3A3EC152C53}" type="datetimeFigureOut">
               <a:rPr lang="en-US" smtClean="0"/>
-              <a:t>9/9/2019</a:t>
+              <a:t>9/10/2019</a:t>
             </a:fld>
             <a:endParaRPr lang="en-US"/>
           </a:p>
@@ -1937,7 +1937,7 @@
           <a:p>
             <a:fld id="{65784E94-7368-4993-AD91-D3A3EC152C53}" type="datetimeFigureOut">
               <a:rPr lang="en-US" smtClean="0"/>
-              <a:t>9/9/2019</a:t>
+              <a:t>9/10/2019</a:t>
             </a:fld>
             <a:endParaRPr lang="en-US"/>
           </a:p>
@@ -2169,7 +2169,7 @@
           <a:p>
             <a:fld id="{65784E94-7368-4993-AD91-D3A3EC152C53}" type="datetimeFigureOut">
               <a:rPr lang="en-US" smtClean="0"/>
-              <a:t>9/9/2019</a:t>
+              <a:t>9/10/2019</a:t>
             </a:fld>
             <a:endParaRPr lang="en-US"/>
           </a:p>
@@ -2536,7 +2536,7 @@
           <a:p>
             <a:fld id="{65784E94-7368-4993-AD91-D3A3EC152C53}" type="datetimeFigureOut">
               <a:rPr lang="en-US" smtClean="0"/>
-              <a:t>9/9/2019</a:t>
+              <a:t>9/10/2019</a:t>
             </a:fld>
             <a:endParaRPr lang="en-US"/>
           </a:p>
@@ -2654,7 +2654,7 @@
           <a:p>
             <a:fld id="{65784E94-7368-4993-AD91-D3A3EC152C53}" type="datetimeFigureOut">
               <a:rPr lang="en-US" smtClean="0"/>
-              <a:t>9/9/2019</a:t>
+              <a:t>9/10/2019</a:t>
             </a:fld>
             <a:endParaRPr lang="en-US"/>
           </a:p>
@@ -2749,7 +2749,7 @@
           <a:p>
             <a:fld id="{65784E94-7368-4993-AD91-D3A3EC152C53}" type="datetimeFigureOut">
               <a:rPr lang="en-US" smtClean="0"/>
-              <a:t>9/9/2019</a:t>
+              <a:t>9/10/2019</a:t>
             </a:fld>
             <a:endParaRPr lang="en-US"/>
           </a:p>
@@ -3026,7 +3026,7 @@
           <a:p>
             <a:fld id="{65784E94-7368-4993-AD91-D3A3EC152C53}" type="datetimeFigureOut">
               <a:rPr lang="en-US" smtClean="0"/>
-              <a:t>9/9/2019</a:t>
+              <a:t>9/10/2019</a:t>
             </a:fld>
             <a:endParaRPr lang="en-US"/>
           </a:p>
@@ -3279,7 +3279,7 @@
           <a:p>
             <a:fld id="{65784E94-7368-4993-AD91-D3A3EC152C53}" type="datetimeFigureOut">
               <a:rPr lang="en-US" smtClean="0"/>
-              <a:t>9/9/2019</a:t>
+              <a:t>9/10/2019</a:t>
             </a:fld>
             <a:endParaRPr lang="en-US"/>
           </a:p>
@@ -3492,7 +3492,7 @@
           <a:p>
             <a:fld id="{65784E94-7368-4993-AD91-D3A3EC152C53}" type="datetimeFigureOut">
               <a:rPr lang="en-US" smtClean="0"/>
-              <a:t>9/9/2019</a:t>
+              <a:t>9/10/2019</a:t>
             </a:fld>
             <a:endParaRPr lang="en-US"/>
           </a:p>
@@ -5294,7 +5294,7 @@
           <a:p>
             <a:pPr algn="ctr"/>
             <a:r>
-              <a:rPr lang="en-US" sz="1600" dirty="0" smtClean="0"/>
+              <a:rPr lang="en-US" sz="2400" dirty="0" smtClean="0"/>
               <a:t>frame</a:t>
             </a:r>
           </a:p>
@@ -5362,7 +5362,7 @@
             <a:p>
               <a:pPr algn="ctr"/>
               <a:r>
-                <a:rPr lang="en-US" sz="1600" dirty="0" smtClean="0"/>
+                <a:rPr lang="en-US" sz="2400" dirty="0" smtClean="0"/>
                 <a:t>background</a:t>
               </a:r>
             </a:p>
@@ -5435,7 +5435,7 @@
             <a:p>
               <a:pPr algn="ctr"/>
               <a:r>
-                <a:rPr lang="en-US" sz="1600" dirty="0" smtClean="0"/>
+                <a:rPr lang="en-US" sz="2400" dirty="0" smtClean="0"/>
                 <a:t>fg mask</a:t>
               </a:r>
             </a:p>
@@ -5901,7 +5901,7 @@
           <p:cNvPr id="8" name="Picture 7" descr="A group of people on a train track with trees in the background&#10;&#10;Description generated with high confidence">
             <a:extLst>
               <a:ext uri="{FF2B5EF4-FFF2-40B4-BE49-F238E27FC236}">
-                <a16:creationId xmlns="" xmlns:a16="http://schemas.microsoft.com/office/drawing/2014/main" id="{709FBF3E-57C3-4DBF-BD6F-A6CAE26E64AF}"/>
+                <a16:creationId xmlns:a16="http://schemas.microsoft.com/office/drawing/2014/main" xmlns="" id="{709FBF3E-57C3-4DBF-BD6F-A6CAE26E64AF}"/>
               </a:ext>
             </a:extLst>
           </p:cNvPr>
@@ -6361,7 +6361,7 @@
             <p:cNvPr id="30" name="Picture 29" descr="A group of people on a train track with trees in the background&#10;&#10;Description generated with high confidence">
               <a:extLst>
                 <a:ext uri="{FF2B5EF4-FFF2-40B4-BE49-F238E27FC236}">
-                  <a16:creationId xmlns="" xmlns:a16="http://schemas.microsoft.com/office/drawing/2014/main" id="{709FBF3E-57C3-4DBF-BD6F-A6CAE26E64AF}"/>
+                  <a16:creationId xmlns:a16="http://schemas.microsoft.com/office/drawing/2014/main" xmlns="" id="{709FBF3E-57C3-4DBF-BD6F-A6CAE26E64AF}"/>
                 </a:ext>
               </a:extLst>
             </p:cNvPr>
@@ -6747,7 +6747,7 @@
               <p:cNvPr id="34" name="Picture 33" descr="A group of people on a train track with trees in the background&#10;&#10;Description generated with high confidence">
                 <a:extLst>
                   <a:ext uri="{FF2B5EF4-FFF2-40B4-BE49-F238E27FC236}">
-                    <a16:creationId xmlns="" xmlns:a16="http://schemas.microsoft.com/office/drawing/2014/main" id="{709FBF3E-57C3-4DBF-BD6F-A6CAE26E64AF}"/>
+                    <a16:creationId xmlns:a16="http://schemas.microsoft.com/office/drawing/2014/main" xmlns="" id="{709FBF3E-57C3-4DBF-BD6F-A6CAE26E64AF}"/>
                   </a:ext>
                 </a:extLst>
               </p:cNvPr>
@@ -7183,7 +7183,7 @@
             <p:cNvPr id="55" name="Picture 54" descr="A group of people on a train track with trees in the background&#10;&#10;Description generated with high confidence">
               <a:extLst>
                 <a:ext uri="{FF2B5EF4-FFF2-40B4-BE49-F238E27FC236}">
-                  <a16:creationId xmlns="" xmlns:a16="http://schemas.microsoft.com/office/drawing/2014/main" id="{709FBF3E-57C3-4DBF-BD6F-A6CAE26E64AF}"/>
+                  <a16:creationId xmlns:a16="http://schemas.microsoft.com/office/drawing/2014/main" xmlns="" id="{709FBF3E-57C3-4DBF-BD6F-A6CAE26E64AF}"/>
                 </a:ext>
               </a:extLst>
             </p:cNvPr>
@@ -8222,28 +8222,28 @@
                 <a:gridCol w="831029">
                   <a:extLst>
                     <a:ext uri="{9D8B030D-6E8A-4147-A177-3AD203B41FA5}">
-                      <a16:colId xmlns="" xmlns:a16="http://schemas.microsoft.com/office/drawing/2014/main" val="661884811"/>
+                      <a16:colId xmlns:a16="http://schemas.microsoft.com/office/drawing/2014/main" xmlns="" val="661884811"/>
                     </a:ext>
                   </a:extLst>
                 </a:gridCol>
                 <a:gridCol w="831029">
                   <a:extLst>
                     <a:ext uri="{9D8B030D-6E8A-4147-A177-3AD203B41FA5}">
-                      <a16:colId xmlns="" xmlns:a16="http://schemas.microsoft.com/office/drawing/2014/main" val="1227113072"/>
+                      <a16:colId xmlns:a16="http://schemas.microsoft.com/office/drawing/2014/main" xmlns="" val="1227113072"/>
                     </a:ext>
                   </a:extLst>
                 </a:gridCol>
                 <a:gridCol w="831029">
                   <a:extLst>
                     <a:ext uri="{9D8B030D-6E8A-4147-A177-3AD203B41FA5}">
-                      <a16:colId xmlns="" xmlns:a16="http://schemas.microsoft.com/office/drawing/2014/main" val="3707013559"/>
+                      <a16:colId xmlns:a16="http://schemas.microsoft.com/office/drawing/2014/main" xmlns="" val="3707013559"/>
                     </a:ext>
                   </a:extLst>
                 </a:gridCol>
                 <a:gridCol w="831029">
                   <a:extLst>
                     <a:ext uri="{9D8B030D-6E8A-4147-A177-3AD203B41FA5}">
-                      <a16:colId xmlns="" xmlns:a16="http://schemas.microsoft.com/office/drawing/2014/main" val="99603296"/>
+                      <a16:colId xmlns:a16="http://schemas.microsoft.com/office/drawing/2014/main" xmlns="" val="99603296"/>
                     </a:ext>
                   </a:extLst>
                 </a:gridCol>
@@ -8483,7 +8483,7 @@
                 </a:tc>
                 <a:extLst>
                   <a:ext uri="{0D108BD9-81ED-4DB2-BD59-A6C34878D82A}">
-                    <a16:rowId xmlns="" xmlns:a16="http://schemas.microsoft.com/office/drawing/2014/main" val="1113007400"/>
+                    <a16:rowId xmlns:a16="http://schemas.microsoft.com/office/drawing/2014/main" xmlns="" val="1113007400"/>
                   </a:ext>
                 </a:extLst>
               </a:tr>
@@ -8726,7 +8726,7 @@
                 </a:tc>
                 <a:extLst>
                   <a:ext uri="{0D108BD9-81ED-4DB2-BD59-A6C34878D82A}">
-                    <a16:rowId xmlns="" xmlns:a16="http://schemas.microsoft.com/office/drawing/2014/main" val="4264905820"/>
+                    <a16:rowId xmlns:a16="http://schemas.microsoft.com/office/drawing/2014/main" xmlns="" val="4264905820"/>
                   </a:ext>
                 </a:extLst>
               </a:tr>
@@ -8969,7 +8969,7 @@
                 </a:tc>
                 <a:extLst>
                   <a:ext uri="{0D108BD9-81ED-4DB2-BD59-A6C34878D82A}">
-                    <a16:rowId xmlns="" xmlns:a16="http://schemas.microsoft.com/office/drawing/2014/main" val="3939078064"/>
+                    <a16:rowId xmlns:a16="http://schemas.microsoft.com/office/drawing/2014/main" xmlns="" val="3939078064"/>
                   </a:ext>
                 </a:extLst>
               </a:tr>
@@ -9212,7 +9212,7 @@
                 </a:tc>
                 <a:extLst>
                   <a:ext uri="{0D108BD9-81ED-4DB2-BD59-A6C34878D82A}">
-                    <a16:rowId xmlns="" xmlns:a16="http://schemas.microsoft.com/office/drawing/2014/main" val="3098635529"/>
+                    <a16:rowId xmlns:a16="http://schemas.microsoft.com/office/drawing/2014/main" xmlns="" val="3098635529"/>
                   </a:ext>
                 </a:extLst>
               </a:tr>
@@ -10497,7 +10497,7 @@
             <p:cNvPr id="15" name="Picture 14" descr="A group of people on a train track with trees in the background&#10;&#10;Description generated with high confidence">
               <a:extLst>
                 <a:ext uri="{FF2B5EF4-FFF2-40B4-BE49-F238E27FC236}">
-                  <a16:creationId xmlns="" xmlns:a16="http://schemas.microsoft.com/office/drawing/2014/main" id="{709FBF3E-57C3-4DBF-BD6F-A6CAE26E64AF}"/>
+                  <a16:creationId xmlns:a16="http://schemas.microsoft.com/office/drawing/2014/main" xmlns="" id="{709FBF3E-57C3-4DBF-BD6F-A6CAE26E64AF}"/>
                 </a:ext>
               </a:extLst>
             </p:cNvPr>
@@ -11770,7 +11770,7 @@
           <p:cNvPr id="6" name="Picture 5" descr="A group of people on a train track with trees in the background&#10;&#10;Description generated with high confidence">
             <a:extLst>
               <a:ext uri="{FF2B5EF4-FFF2-40B4-BE49-F238E27FC236}">
-                <a16:creationId xmlns="" xmlns:a16="http://schemas.microsoft.com/office/drawing/2014/main" id="{709FBF3E-57C3-4DBF-BD6F-A6CAE26E64AF}"/>
+                <a16:creationId xmlns:a16="http://schemas.microsoft.com/office/drawing/2014/main" xmlns="" id="{709FBF3E-57C3-4DBF-BD6F-A6CAE26E64AF}"/>
               </a:ext>
             </a:extLst>
           </p:cNvPr>
@@ -11990,7 +11990,7 @@
           <p:cNvPr id="13" name="Picture 12" descr="A group of people on a train track with trees in the background&#10;&#10;Description generated with high confidence">
             <a:extLst>
               <a:ext uri="{FF2B5EF4-FFF2-40B4-BE49-F238E27FC236}">
-                <a16:creationId xmlns="" xmlns:a16="http://schemas.microsoft.com/office/drawing/2014/main" id="{709FBF3E-57C3-4DBF-BD6F-A6CAE26E64AF}"/>
+                <a16:creationId xmlns:a16="http://schemas.microsoft.com/office/drawing/2014/main" xmlns="" id="{709FBF3E-57C3-4DBF-BD6F-A6CAE26E64AF}"/>
               </a:ext>
             </a:extLst>
           </p:cNvPr>
@@ -12710,7 +12710,7 @@
           <p:cNvPr id="15" name="Picture 14" descr="A group of people on a train track with trees in the background&#10;&#10;Description generated with high confidence">
             <a:extLst>
               <a:ext uri="{FF2B5EF4-FFF2-40B4-BE49-F238E27FC236}">
-                <a16:creationId xmlns="" xmlns:a16="http://schemas.microsoft.com/office/drawing/2014/main" id="{709FBF3E-57C3-4DBF-BD6F-A6CAE26E64AF}"/>
+                <a16:creationId xmlns:a16="http://schemas.microsoft.com/office/drawing/2014/main" xmlns="" id="{709FBF3E-57C3-4DBF-BD6F-A6CAE26E64AF}"/>
               </a:ext>
             </a:extLst>
           </p:cNvPr>

</xml_diff>

<commit_message>
added more elaborate explanation of framework
</commit_message>
<xml_diff>
--- a/images/support.pptx
+++ b/images/support.pptx
@@ -5,18 +5,19 @@
     <p:sldMasterId id="2147483648" r:id="rId1"/>
   </p:sldMasterIdLst>
   <p:notesMasterIdLst>
-    <p:notesMasterId r:id="rId11"/>
+    <p:notesMasterId r:id="rId12"/>
   </p:notesMasterIdLst>
   <p:sldIdLst>
-    <p:sldId id="257" r:id="rId2"/>
-    <p:sldId id="259" r:id="rId3"/>
-    <p:sldId id="260" r:id="rId4"/>
-    <p:sldId id="261" r:id="rId5"/>
-    <p:sldId id="262" r:id="rId6"/>
-    <p:sldId id="263" r:id="rId7"/>
-    <p:sldId id="264" r:id="rId8"/>
-    <p:sldId id="265" r:id="rId9"/>
-    <p:sldId id="266" r:id="rId10"/>
+    <p:sldId id="267" r:id="rId2"/>
+    <p:sldId id="257" r:id="rId3"/>
+    <p:sldId id="259" r:id="rId4"/>
+    <p:sldId id="260" r:id="rId5"/>
+    <p:sldId id="261" r:id="rId6"/>
+    <p:sldId id="262" r:id="rId7"/>
+    <p:sldId id="263" r:id="rId8"/>
+    <p:sldId id="264" r:id="rId9"/>
+    <p:sldId id="265" r:id="rId10"/>
+    <p:sldId id="266" r:id="rId11"/>
   </p:sldIdLst>
   <p:sldSz cx="12192000" cy="6858000"/>
   <p:notesSz cx="6858000" cy="9144000"/>
@@ -205,7 +206,7 @@
           <a:p>
             <a:fld id="{C1FFD92D-F991-483E-B5E8-A24C276DA1FE}" type="datetimeFigureOut">
               <a:rPr lang="en-US" smtClean="0"/>
-              <a:t>9/10/2019</a:t>
+              <a:t>9/11/2019</a:t>
             </a:fld>
             <a:endParaRPr lang="en-US"/>
           </a:p>
@@ -519,11 +520,58 @@
           <a:p>
             <a:r>
               <a:rPr lang="en-US" dirty="0" smtClean="0"/>
-              <a:t>Inspired</a:t>
+              <a:t>So, in order</a:t>
             </a:r>
             <a:r>
               <a:rPr lang="en-US" baseline="0" dirty="0" smtClean="0"/>
-              <a:t> by the framework we design this pipe line. You take each frame and then try to classify whether the frame as activity or not.  If it turns out that it’s a activity frame only then you process it with stage 2. And then stage 2 is going to decide whether there is human trespassing or not. At the end, you concatenate predictions for all the frames and turn it into a time series. </a:t>
+              <a:t> to solve the main task, this is how we model the problem. We have a two stage decision tree. </a:t>
+            </a:r>
+          </a:p>
+          <a:p>
+            <a:endParaRPr lang="en-US" baseline="0" dirty="0" smtClean="0"/>
+          </a:p>
+          <a:p>
+            <a:r>
+              <a:rPr lang="en-US" baseline="0" dirty="0" smtClean="0"/>
+              <a:t>S1</a:t>
+            </a:r>
+          </a:p>
+          <a:p>
+            <a:r>
+              <a:rPr lang="en-US" baseline="0" dirty="0" smtClean="0"/>
+              <a:t>In the first stage, we decide whether a particular frame is foreground frame or not. </a:t>
+            </a:r>
+          </a:p>
+          <a:p>
+            <a:r>
+              <a:rPr lang="en-US" baseline="0" dirty="0" smtClean="0"/>
+              <a:t>We hypothesize that our surveillance videos are sparse in terms of trespassing activity. So, instead of trying to look at every single frame we only want to look at those frames which show some change.  Secondly, we are also interested in exploring how much amount of change should be considered sufficient enough to be considered for 2</a:t>
+            </a:r>
+            <a:r>
+              <a:rPr lang="en-US" baseline="30000" dirty="0" smtClean="0"/>
+              <a:t>nd</a:t>
+            </a:r>
+            <a:r>
+              <a:rPr lang="en-US" baseline="0" dirty="0" smtClean="0"/>
+              <a:t> stage processing and how does it impact the performance of whole system.</a:t>
+            </a:r>
+          </a:p>
+          <a:p>
+            <a:endParaRPr lang="en-US" baseline="0" dirty="0" smtClean="0"/>
+          </a:p>
+          <a:p>
+            <a:r>
+              <a:rPr lang="en-US" baseline="0" dirty="0" smtClean="0"/>
+              <a:t>S2If it turns out that a particular frame is designated as foreground frame, then will be processed through stage2. Stage2 tries to classify where there is trespassing activity in that frame or not. </a:t>
+            </a:r>
+          </a:p>
+          <a:p>
+            <a:endParaRPr lang="en-US" baseline="0" dirty="0" smtClean="0"/>
+          </a:p>
+          <a:p>
+            <a:r>
+              <a:rPr lang="en-US" baseline="0" dirty="0" smtClean="0"/>
+              <a:t>Our intuition is that we should use a relatively low complexity stage1 which can quickly take out most of the background frames. And only a subset of frames should be processed by stage2. And for stage2 we want to have a relatively stronger classifier. </a:t>
             </a:r>
             <a:endParaRPr lang="en-US" dirty="0"/>
           </a:p>
@@ -556,7 +604,7 @@
     </p:spTree>
     <p:extLst>
       <p:ext uri="{BB962C8B-B14F-4D97-AF65-F5344CB8AC3E}">
-        <p14:creationId xmlns:p14="http://schemas.microsoft.com/office/powerpoint/2010/main" val="4288180234"/>
+        <p14:creationId xmlns:p14="http://schemas.microsoft.com/office/powerpoint/2010/main" val="3150594697"/>
       </p:ext>
     </p:extLst>
   </p:cSld>
@@ -612,11 +660,11 @@
           <a:p>
             <a:r>
               <a:rPr lang="en-US" dirty="0" smtClean="0"/>
-              <a:t>So, our stage 1 is basically a background</a:t>
+              <a:t>Inspired</a:t>
             </a:r>
             <a:r>
               <a:rPr lang="en-US" baseline="0" dirty="0" smtClean="0"/>
-              <a:t> subtraction stage. What you are doing is that you take a frame and compare it with a background model. </a:t>
+              <a:t> by the framework we design this pipe line. You take each frame and then try to classify whether the frame as activity or not.  If it turns out that it’s a activity frame only then you process it with stage 2. And then stage 2 is going to decide whether there is human trespassing or not. At the end, you concatenate predictions for all the frames and turn it into a time series. </a:t>
             </a:r>
             <a:endParaRPr lang="en-US" dirty="0"/>
           </a:p>
@@ -649,7 +697,7 @@
     </p:spTree>
     <p:extLst>
       <p:ext uri="{BB962C8B-B14F-4D97-AF65-F5344CB8AC3E}">
-        <p14:creationId xmlns:p14="http://schemas.microsoft.com/office/powerpoint/2010/main" val="2195476614"/>
+        <p14:creationId xmlns:p14="http://schemas.microsoft.com/office/powerpoint/2010/main" val="4288180234"/>
       </p:ext>
     </p:extLst>
   </p:cSld>
@@ -703,6 +751,14 @@
           <a:bodyPr/>
           <a:lstStyle/>
           <a:p>
+            <a:r>
+              <a:rPr lang="en-US" dirty="0" smtClean="0"/>
+              <a:t>So, our stage 1 is basically a background</a:t>
+            </a:r>
+            <a:r>
+              <a:rPr lang="en-US" baseline="0" dirty="0" smtClean="0"/>
+              <a:t> subtraction stage. What you are doing is that you take a frame and compare it with a background model. </a:t>
+            </a:r>
             <a:endParaRPr lang="en-US" dirty="0"/>
           </a:p>
         </p:txBody>
@@ -734,7 +790,7 @@
     </p:spTree>
     <p:extLst>
       <p:ext uri="{BB962C8B-B14F-4D97-AF65-F5344CB8AC3E}">
-        <p14:creationId xmlns:p14="http://schemas.microsoft.com/office/powerpoint/2010/main" val="873796668"/>
+        <p14:creationId xmlns:p14="http://schemas.microsoft.com/office/powerpoint/2010/main" val="2195476614"/>
       </p:ext>
     </p:extLst>
   </p:cSld>
@@ -788,23 +844,6 @@
           <a:bodyPr/>
           <a:lstStyle/>
           <a:p>
-            <a:r>
-              <a:rPr lang="en-US" dirty="0" smtClean="0"/>
-              <a:t>Before moving on with the Faster RCNN. It is</a:t>
-            </a:r>
-            <a:r>
-              <a:rPr lang="en-US" baseline="0" dirty="0" smtClean="0"/>
-              <a:t> important that we understand the concept of anchors. It was a novel concept introduced by Faster RCNN and it has now become a fundamental part of object detection algorithms. </a:t>
-            </a:r>
-          </a:p>
-          <a:p>
-            <a:endParaRPr lang="en-US" baseline="0" dirty="0" smtClean="0"/>
-          </a:p>
-          <a:p>
-            <a:r>
-              <a:rPr lang="en-US" baseline="0" dirty="0" smtClean="0"/>
-              <a:t>So an anchor is basically nothing but an estimate of object bounding box.  </a:t>
-            </a:r>
             <a:endParaRPr lang="en-US" dirty="0"/>
           </a:p>
         </p:txBody>
@@ -836,7 +875,7 @@
     </p:spTree>
     <p:extLst>
       <p:ext uri="{BB962C8B-B14F-4D97-AF65-F5344CB8AC3E}">
-        <p14:creationId xmlns:p14="http://schemas.microsoft.com/office/powerpoint/2010/main" val="630483716"/>
+        <p14:creationId xmlns:p14="http://schemas.microsoft.com/office/powerpoint/2010/main" val="873796668"/>
       </p:ext>
     </p:extLst>
   </p:cSld>
@@ -892,11 +931,20 @@
           <a:p>
             <a:r>
               <a:rPr lang="en-US" dirty="0" smtClean="0"/>
-              <a:t>Once,</a:t>
+              <a:t>Before moving on with the Faster RCNN. It is</a:t>
             </a:r>
             <a:r>
               <a:rPr lang="en-US" baseline="0" dirty="0" smtClean="0"/>
-              <a:t> we have used RPN to predict proposals, it looks something like this. We need to clean it up to look like one on right.  This is done using a process known as NMS. </a:t>
+              <a:t> important that we understand the concept of anchors. It was a novel concept introduced by Faster RCNN and it has now become a fundamental part of object detection algorithms. </a:t>
+            </a:r>
+          </a:p>
+          <a:p>
+            <a:endParaRPr lang="en-US" baseline="0" dirty="0" smtClean="0"/>
+          </a:p>
+          <a:p>
+            <a:r>
+              <a:rPr lang="en-US" baseline="0" dirty="0" smtClean="0"/>
+              <a:t>So an anchor is basically nothing but an estimate of object bounding box.  </a:t>
             </a:r>
             <a:endParaRPr lang="en-US" dirty="0"/>
           </a:p>
@@ -920,7 +968,7 @@
             <a:fld id="{78E4A049-8685-4352-9DC2-828F08FD542B}" type="slidenum">
               <a:rPr lang="en-US" smtClean="0"/>
               <a:pPr/>
-              <a:t>6</a:t>
+              <a:t>5</a:t>
             </a:fld>
             <a:endParaRPr lang="en-US"/>
           </a:p>
@@ -929,7 +977,7 @@
     </p:spTree>
     <p:extLst>
       <p:ext uri="{BB962C8B-B14F-4D97-AF65-F5344CB8AC3E}">
-        <p14:creationId xmlns:p14="http://schemas.microsoft.com/office/powerpoint/2010/main" val="3896337287"/>
+        <p14:creationId xmlns:p14="http://schemas.microsoft.com/office/powerpoint/2010/main" val="630483716"/>
       </p:ext>
     </p:extLst>
   </p:cSld>
@@ -985,19 +1033,11 @@
           <a:p>
             <a:r>
               <a:rPr lang="en-US" dirty="0" smtClean="0"/>
-              <a:t>Now</a:t>
+              <a:t>Once,</a:t>
             </a:r>
             <a:r>
               <a:rPr lang="en-US" baseline="0" dirty="0" smtClean="0"/>
-              <a:t> that we have applied </a:t>
-            </a:r>
-            <a:r>
-              <a:rPr lang="en-US" baseline="0" dirty="0" err="1" smtClean="0"/>
-              <a:t>RoI</a:t>
-            </a:r>
-            <a:r>
-              <a:rPr lang="en-US" baseline="0" dirty="0" smtClean="0"/>
-              <a:t> pooling on feature map, we are ready to classify it. </a:t>
+              <a:t> we have used RPN to predict proposals, it looks something like this. We need to clean it up to look like one on right.  This is done using a process known as NMS. </a:t>
             </a:r>
             <a:endParaRPr lang="en-US" dirty="0"/>
           </a:p>
@@ -1022,6 +1062,107 @@
               <a:rPr lang="en-US" smtClean="0"/>
               <a:pPr/>
               <a:t>7</a:t>
+            </a:fld>
+            <a:endParaRPr lang="en-US"/>
+          </a:p>
+        </p:txBody>
+      </p:sp>
+    </p:spTree>
+    <p:extLst>
+      <p:ext uri="{BB962C8B-B14F-4D97-AF65-F5344CB8AC3E}">
+        <p14:creationId xmlns:p14="http://schemas.microsoft.com/office/powerpoint/2010/main" val="3896337287"/>
+      </p:ext>
+    </p:extLst>
+  </p:cSld>
+  <p:clrMapOvr>
+    <a:masterClrMapping/>
+  </p:clrMapOvr>
+</p:notes>
+</file>
+
+<file path=ppt/notesSlides/notesSlide7.xml><?xml version="1.0" encoding="utf-8"?>
+<p:notes xmlns:a="http://schemas.openxmlformats.org/drawingml/2006/main" xmlns:r="http://schemas.openxmlformats.org/officeDocument/2006/relationships" xmlns:p="http://schemas.openxmlformats.org/presentationml/2006/main">
+  <p:cSld>
+    <p:spTree>
+      <p:nvGrpSpPr>
+        <p:cNvPr id="1" name=""/>
+        <p:cNvGrpSpPr/>
+        <p:nvPr/>
+      </p:nvGrpSpPr>
+      <p:grpSpPr>
+        <a:xfrm>
+          <a:off x="0" y="0"/>
+          <a:ext cx="0" cy="0"/>
+          <a:chOff x="0" y="0"/>
+          <a:chExt cx="0" cy="0"/>
+        </a:xfrm>
+      </p:grpSpPr>
+      <p:sp>
+        <p:nvSpPr>
+          <p:cNvPr id="2" name="Slide Image Placeholder 1"/>
+          <p:cNvSpPr>
+            <a:spLocks noGrp="1" noRot="1" noChangeAspect="1"/>
+          </p:cNvSpPr>
+          <p:nvPr>
+            <p:ph type="sldImg"/>
+          </p:nvPr>
+        </p:nvSpPr>
+        <p:spPr/>
+      </p:sp>
+      <p:sp>
+        <p:nvSpPr>
+          <p:cNvPr id="3" name="Notes Placeholder 2"/>
+          <p:cNvSpPr>
+            <a:spLocks noGrp="1"/>
+          </p:cNvSpPr>
+          <p:nvPr>
+            <p:ph type="body" idx="1"/>
+          </p:nvPr>
+        </p:nvSpPr>
+        <p:spPr/>
+        <p:txBody>
+          <a:bodyPr/>
+          <a:lstStyle/>
+          <a:p>
+            <a:r>
+              <a:rPr lang="en-US" dirty="0" smtClean="0"/>
+              <a:t>Now</a:t>
+            </a:r>
+            <a:r>
+              <a:rPr lang="en-US" baseline="0" dirty="0" smtClean="0"/>
+              <a:t> that we have applied </a:t>
+            </a:r>
+            <a:r>
+              <a:rPr lang="en-US" baseline="0" dirty="0" err="1" smtClean="0"/>
+              <a:t>RoI</a:t>
+            </a:r>
+            <a:r>
+              <a:rPr lang="en-US" baseline="0" dirty="0" smtClean="0"/>
+              <a:t> pooling on feature map, we are ready to classify it. </a:t>
+            </a:r>
+            <a:endParaRPr lang="en-US" dirty="0"/>
+          </a:p>
+        </p:txBody>
+      </p:sp>
+      <p:sp>
+        <p:nvSpPr>
+          <p:cNvPr id="4" name="Slide Number Placeholder 3"/>
+          <p:cNvSpPr>
+            <a:spLocks noGrp="1"/>
+          </p:cNvSpPr>
+          <p:nvPr>
+            <p:ph type="sldNum" sz="quarter" idx="10"/>
+          </p:nvPr>
+        </p:nvSpPr>
+        <p:spPr/>
+        <p:txBody>
+          <a:bodyPr/>
+          <a:lstStyle/>
+          <a:p>
+            <a:fld id="{78E4A049-8685-4352-9DC2-828F08FD542B}" type="slidenum">
+              <a:rPr lang="en-US" smtClean="0"/>
+              <a:pPr/>
+              <a:t>8</a:t>
             </a:fld>
             <a:endParaRPr lang="en-US"/>
           </a:p>
@@ -1171,7 +1312,7 @@
           <a:p>
             <a:fld id="{65784E94-7368-4993-AD91-D3A3EC152C53}" type="datetimeFigureOut">
               <a:rPr lang="en-US" smtClean="0"/>
-              <a:t>9/10/2019</a:t>
+              <a:t>9/11/2019</a:t>
             </a:fld>
             <a:endParaRPr lang="en-US"/>
           </a:p>
@@ -1341,7 +1482,7 @@
           <a:p>
             <a:fld id="{65784E94-7368-4993-AD91-D3A3EC152C53}" type="datetimeFigureOut">
               <a:rPr lang="en-US" smtClean="0"/>
-              <a:t>9/10/2019</a:t>
+              <a:t>9/11/2019</a:t>
             </a:fld>
             <a:endParaRPr lang="en-US"/>
           </a:p>
@@ -1521,7 +1662,7 @@
           <a:p>
             <a:fld id="{65784E94-7368-4993-AD91-D3A3EC152C53}" type="datetimeFigureOut">
               <a:rPr lang="en-US" smtClean="0"/>
-              <a:t>9/10/2019</a:t>
+              <a:t>9/11/2019</a:t>
             </a:fld>
             <a:endParaRPr lang="en-US"/>
           </a:p>
@@ -1691,7 +1832,7 @@
           <a:p>
             <a:fld id="{65784E94-7368-4993-AD91-D3A3EC152C53}" type="datetimeFigureOut">
               <a:rPr lang="en-US" smtClean="0"/>
-              <a:t>9/10/2019</a:t>
+              <a:t>9/11/2019</a:t>
             </a:fld>
             <a:endParaRPr lang="en-US"/>
           </a:p>
@@ -1937,7 +2078,7 @@
           <a:p>
             <a:fld id="{65784E94-7368-4993-AD91-D3A3EC152C53}" type="datetimeFigureOut">
               <a:rPr lang="en-US" smtClean="0"/>
-              <a:t>9/10/2019</a:t>
+              <a:t>9/11/2019</a:t>
             </a:fld>
             <a:endParaRPr lang="en-US"/>
           </a:p>
@@ -2169,7 +2310,7 @@
           <a:p>
             <a:fld id="{65784E94-7368-4993-AD91-D3A3EC152C53}" type="datetimeFigureOut">
               <a:rPr lang="en-US" smtClean="0"/>
-              <a:t>9/10/2019</a:t>
+              <a:t>9/11/2019</a:t>
             </a:fld>
             <a:endParaRPr lang="en-US"/>
           </a:p>
@@ -2536,7 +2677,7 @@
           <a:p>
             <a:fld id="{65784E94-7368-4993-AD91-D3A3EC152C53}" type="datetimeFigureOut">
               <a:rPr lang="en-US" smtClean="0"/>
-              <a:t>9/10/2019</a:t>
+              <a:t>9/11/2019</a:t>
             </a:fld>
             <a:endParaRPr lang="en-US"/>
           </a:p>
@@ -2654,7 +2795,7 @@
           <a:p>
             <a:fld id="{65784E94-7368-4993-AD91-D3A3EC152C53}" type="datetimeFigureOut">
               <a:rPr lang="en-US" smtClean="0"/>
-              <a:t>9/10/2019</a:t>
+              <a:t>9/11/2019</a:t>
             </a:fld>
             <a:endParaRPr lang="en-US"/>
           </a:p>
@@ -2749,7 +2890,7 @@
           <a:p>
             <a:fld id="{65784E94-7368-4993-AD91-D3A3EC152C53}" type="datetimeFigureOut">
               <a:rPr lang="en-US" smtClean="0"/>
-              <a:t>9/10/2019</a:t>
+              <a:t>9/11/2019</a:t>
             </a:fld>
             <a:endParaRPr lang="en-US"/>
           </a:p>
@@ -3026,7 +3167,7 @@
           <a:p>
             <a:fld id="{65784E94-7368-4993-AD91-D3A3EC152C53}" type="datetimeFigureOut">
               <a:rPr lang="en-US" smtClean="0"/>
-              <a:t>9/10/2019</a:t>
+              <a:t>9/11/2019</a:t>
             </a:fld>
             <a:endParaRPr lang="en-US"/>
           </a:p>
@@ -3279,7 +3420,7 @@
           <a:p>
             <a:fld id="{65784E94-7368-4993-AD91-D3A3EC152C53}" type="datetimeFigureOut">
               <a:rPr lang="en-US" smtClean="0"/>
-              <a:t>9/10/2019</a:t>
+              <a:t>9/11/2019</a:t>
             </a:fld>
             <a:endParaRPr lang="en-US"/>
           </a:p>
@@ -3492,7 +3633,7 @@
           <a:p>
             <a:fld id="{65784E94-7368-4993-AD91-D3A3EC152C53}" type="datetimeFigureOut">
               <a:rPr lang="en-US" smtClean="0"/>
-              <a:t>9/10/2019</a:t>
+              <a:t>9/11/2019</a:t>
             </a:fld>
             <a:endParaRPr lang="en-US"/>
           </a:p>
@@ -3899,6 +4040,2456 @@
       </p:grpSpPr>
       <p:sp>
         <p:nvSpPr>
+          <p:cNvPr id="4" name="Title 3"/>
+          <p:cNvSpPr>
+            <a:spLocks noGrp="1"/>
+          </p:cNvSpPr>
+          <p:nvPr>
+            <p:ph type="title"/>
+          </p:nvPr>
+        </p:nvSpPr>
+        <p:spPr/>
+        <p:txBody>
+          <a:bodyPr/>
+          <a:lstStyle/>
+          <a:p>
+            <a:pPr algn="ctr"/>
+            <a:endParaRPr lang="en-US" dirty="0"/>
+          </a:p>
+        </p:txBody>
+      </p:sp>
+      <p:sp>
+        <p:nvSpPr>
+          <p:cNvPr id="3" name="Footer Placeholder 2"/>
+          <p:cNvSpPr>
+            <a:spLocks noGrp="1"/>
+          </p:cNvSpPr>
+          <p:nvPr>
+            <p:ph type="ftr" sz="quarter" idx="11"/>
+          </p:nvPr>
+        </p:nvSpPr>
+        <p:spPr/>
+        <p:txBody>
+          <a:bodyPr/>
+          <a:lstStyle/>
+          <a:p>
+            <a:endParaRPr lang="en-US" dirty="0"/>
+          </a:p>
+        </p:txBody>
+      </p:sp>
+      <p:sp>
+        <p:nvSpPr>
+          <p:cNvPr id="2" name="Slide Number Placeholder 1"/>
+          <p:cNvSpPr>
+            <a:spLocks noGrp="1"/>
+          </p:cNvSpPr>
+          <p:nvPr>
+            <p:ph type="sldNum" sz="quarter" idx="12"/>
+          </p:nvPr>
+        </p:nvSpPr>
+        <p:spPr/>
+        <p:txBody>
+          <a:bodyPr/>
+          <a:lstStyle/>
+          <a:p>
+            <a:fld id="{BFEBEB0A-9E3D-4B14-9782-E2AE3DA60D96}" type="slidenum">
+              <a:rPr lang="en-US" smtClean="0"/>
+              <a:pPr/>
+              <a:t>1</a:t>
+            </a:fld>
+            <a:endParaRPr lang="en-US" dirty="0"/>
+          </a:p>
+        </p:txBody>
+      </p:sp>
+      <p:sp>
+        <p:nvSpPr>
+          <p:cNvPr id="7" name="Rectangle 6"/>
+          <p:cNvSpPr/>
+          <p:nvPr/>
+        </p:nvSpPr>
+        <p:spPr bwMode="auto">
+          <a:xfrm>
+            <a:off x="6758100" y="1697681"/>
+            <a:ext cx="1828800" cy="581880"/>
+          </a:xfrm>
+          <a:prstGeom prst="rect">
+            <a:avLst/>
+          </a:prstGeom>
+          <a:ln>
+            <a:headEnd/>
+            <a:tailEnd/>
+          </a:ln>
+        </p:spPr>
+        <p:style>
+          <a:lnRef idx="2">
+            <a:schemeClr val="dk1"/>
+          </a:lnRef>
+          <a:fillRef idx="1">
+            <a:schemeClr val="lt1"/>
+          </a:fillRef>
+          <a:effectRef idx="0">
+            <a:schemeClr val="dk1"/>
+          </a:effectRef>
+          <a:fontRef idx="minor">
+            <a:schemeClr val="dk1"/>
+          </a:fontRef>
+        </p:style>
+        <p:txBody>
+          <a:bodyPr wrap="none" rtlCol="0" anchor="ctr"/>
+          <a:lstStyle/>
+          <a:p>
+            <a:pPr algn="ctr"/>
+            <a:r>
+              <a:rPr lang="en-US" sz="2400" dirty="0" smtClean="0">
+                <a:ln w="0"/>
+                <a:solidFill>
+                  <a:schemeClr val="tx1"/>
+                </a:solidFill>
+                <a:effectLst>
+                  <a:outerShdw blurRad="38100" dist="19050" dir="2700000" algn="tl" rotWithShape="0">
+                    <a:schemeClr val="dk1">
+                      <a:alpha val="40000"/>
+                    </a:schemeClr>
+                  </a:outerShdw>
+                </a:effectLst>
+                <a:latin typeface="+mn-lt"/>
+              </a:rPr>
+              <a:t>Frame</a:t>
+            </a:r>
+            <a:endParaRPr lang="en-US" sz="1600" dirty="0" smtClean="0">
+              <a:ln w="0"/>
+              <a:solidFill>
+                <a:schemeClr val="tx1"/>
+              </a:solidFill>
+              <a:effectLst>
+                <a:outerShdw blurRad="38100" dist="19050" dir="2700000" algn="tl" rotWithShape="0">
+                  <a:schemeClr val="dk1">
+                    <a:alpha val="40000"/>
+                  </a:schemeClr>
+                </a:outerShdw>
+              </a:effectLst>
+              <a:latin typeface="+mn-lt"/>
+            </a:endParaRPr>
+          </a:p>
+        </p:txBody>
+      </p:sp>
+      <p:sp>
+        <p:nvSpPr>
+          <p:cNvPr id="10" name="Rectangle 9"/>
+          <p:cNvSpPr/>
+          <p:nvPr/>
+        </p:nvSpPr>
+        <p:spPr bwMode="auto">
+          <a:xfrm>
+            <a:off x="4935666" y="3149861"/>
+            <a:ext cx="1828800" cy="581880"/>
+          </a:xfrm>
+          <a:prstGeom prst="rect">
+            <a:avLst/>
+          </a:prstGeom>
+          <a:ln>
+            <a:headEnd/>
+            <a:tailEnd/>
+          </a:ln>
+        </p:spPr>
+        <p:style>
+          <a:lnRef idx="2">
+            <a:schemeClr val="dk1"/>
+          </a:lnRef>
+          <a:fillRef idx="1">
+            <a:schemeClr val="lt1"/>
+          </a:fillRef>
+          <a:effectRef idx="0">
+            <a:schemeClr val="dk1"/>
+          </a:effectRef>
+          <a:fontRef idx="minor">
+            <a:schemeClr val="dk1"/>
+          </a:fontRef>
+        </p:style>
+        <p:txBody>
+          <a:bodyPr wrap="none" rtlCol="0" anchor="ctr"/>
+          <a:lstStyle/>
+          <a:p>
+            <a:pPr algn="ctr"/>
+            <a:r>
+              <a:rPr lang="en-US" sz="2400" dirty="0" smtClean="0">
+                <a:ln w="0"/>
+                <a:solidFill>
+                  <a:schemeClr val="tx1"/>
+                </a:solidFill>
+                <a:effectLst>
+                  <a:outerShdw blurRad="38100" dist="19050" dir="2700000" algn="tl" rotWithShape="0">
+                    <a:schemeClr val="dk1">
+                      <a:alpha val="40000"/>
+                    </a:schemeClr>
+                  </a:outerShdw>
+                </a:effectLst>
+                <a:latin typeface="+mn-lt"/>
+              </a:rPr>
+              <a:t>Activity</a:t>
+            </a:r>
+            <a:endParaRPr lang="en-US" sz="1600" dirty="0" smtClean="0">
+              <a:ln w="0"/>
+              <a:solidFill>
+                <a:schemeClr val="tx1"/>
+              </a:solidFill>
+              <a:effectLst>
+                <a:outerShdw blurRad="38100" dist="19050" dir="2700000" algn="tl" rotWithShape="0">
+                  <a:schemeClr val="dk1">
+                    <a:alpha val="40000"/>
+                  </a:schemeClr>
+                </a:outerShdw>
+              </a:effectLst>
+              <a:latin typeface="+mn-lt"/>
+            </a:endParaRPr>
+          </a:p>
+        </p:txBody>
+      </p:sp>
+      <p:sp>
+        <p:nvSpPr>
+          <p:cNvPr id="11" name="Rectangle 10"/>
+          <p:cNvSpPr/>
+          <p:nvPr/>
+        </p:nvSpPr>
+        <p:spPr bwMode="auto">
+          <a:xfrm>
+            <a:off x="8594498" y="3143672"/>
+            <a:ext cx="2056329" cy="581880"/>
+          </a:xfrm>
+          <a:prstGeom prst="rect">
+            <a:avLst/>
+          </a:prstGeom>
+          <a:ln>
+            <a:headEnd/>
+            <a:tailEnd/>
+          </a:ln>
+        </p:spPr>
+        <p:style>
+          <a:lnRef idx="2">
+            <a:schemeClr val="dk1"/>
+          </a:lnRef>
+          <a:fillRef idx="1">
+            <a:schemeClr val="lt1"/>
+          </a:fillRef>
+          <a:effectRef idx="0">
+            <a:schemeClr val="dk1"/>
+          </a:effectRef>
+          <a:fontRef idx="minor">
+            <a:schemeClr val="dk1"/>
+          </a:fontRef>
+        </p:style>
+        <p:txBody>
+          <a:bodyPr wrap="none" rtlCol="0" anchor="ctr"/>
+          <a:lstStyle/>
+          <a:p>
+            <a:pPr algn="ctr"/>
+            <a:r>
+              <a:rPr lang="en-US" sz="2400" dirty="0" smtClean="0">
+                <a:ln w="0"/>
+                <a:solidFill>
+                  <a:schemeClr val="tx1"/>
+                </a:solidFill>
+                <a:effectLst>
+                  <a:outerShdw blurRad="38100" dist="19050" dir="2700000" algn="tl" rotWithShape="0">
+                    <a:schemeClr val="dk1">
+                      <a:alpha val="40000"/>
+                    </a:schemeClr>
+                  </a:outerShdw>
+                </a:effectLst>
+                <a:latin typeface="+mn-lt"/>
+              </a:rPr>
+              <a:t>Background</a:t>
+            </a:r>
+            <a:endParaRPr lang="en-US" sz="1600" dirty="0" smtClean="0">
+              <a:ln w="0"/>
+              <a:solidFill>
+                <a:schemeClr val="tx1"/>
+              </a:solidFill>
+              <a:effectLst>
+                <a:outerShdw blurRad="38100" dist="19050" dir="2700000" algn="tl" rotWithShape="0">
+                  <a:schemeClr val="dk1">
+                    <a:alpha val="40000"/>
+                  </a:schemeClr>
+                </a:outerShdw>
+              </a:effectLst>
+              <a:latin typeface="+mn-lt"/>
+            </a:endParaRPr>
+          </a:p>
+        </p:txBody>
+      </p:sp>
+      <p:sp>
+        <p:nvSpPr>
+          <p:cNvPr id="12" name="Rectangle 11"/>
+          <p:cNvSpPr/>
+          <p:nvPr/>
+        </p:nvSpPr>
+        <p:spPr bwMode="auto">
+          <a:xfrm>
+            <a:off x="6756400" y="4606880"/>
+            <a:ext cx="1828800" cy="640080"/>
+          </a:xfrm>
+          <a:prstGeom prst="rect">
+            <a:avLst/>
+          </a:prstGeom>
+          <a:ln>
+            <a:headEnd/>
+            <a:tailEnd/>
+          </a:ln>
+        </p:spPr>
+        <p:style>
+          <a:lnRef idx="2">
+            <a:schemeClr val="dk1"/>
+          </a:lnRef>
+          <a:fillRef idx="1">
+            <a:schemeClr val="lt1"/>
+          </a:fillRef>
+          <a:effectRef idx="0">
+            <a:schemeClr val="dk1"/>
+          </a:effectRef>
+          <a:fontRef idx="minor">
+            <a:schemeClr val="dk1"/>
+          </a:fontRef>
+        </p:style>
+        <p:txBody>
+          <a:bodyPr wrap="none" rtlCol="0" anchor="ctr"/>
+          <a:lstStyle/>
+          <a:p>
+            <a:pPr algn="ctr"/>
+            <a:r>
+              <a:rPr lang="en-US" sz="2000" dirty="0" smtClean="0">
+                <a:ln w="0"/>
+                <a:solidFill>
+                  <a:schemeClr val="tx1"/>
+                </a:solidFill>
+                <a:effectLst>
+                  <a:outerShdw blurRad="38100" dist="19050" dir="2700000" algn="tl" rotWithShape="0">
+                    <a:schemeClr val="dk1">
+                      <a:alpha val="40000"/>
+                    </a:schemeClr>
+                  </a:outerShdw>
+                </a:effectLst>
+              </a:rPr>
+              <a:t>Other</a:t>
+            </a:r>
+            <a:endParaRPr lang="en-US" sz="2000" dirty="0">
+              <a:ln w="0"/>
+              <a:solidFill>
+                <a:schemeClr val="tx1"/>
+              </a:solidFill>
+              <a:effectLst>
+                <a:outerShdw blurRad="38100" dist="19050" dir="2700000" algn="tl" rotWithShape="0">
+                  <a:schemeClr val="dk1">
+                    <a:alpha val="40000"/>
+                  </a:schemeClr>
+                </a:outerShdw>
+              </a:effectLst>
+            </a:endParaRPr>
+          </a:p>
+          <a:p>
+            <a:pPr algn="ctr"/>
+            <a:r>
+              <a:rPr lang="en-US" sz="2000" dirty="0" smtClean="0">
+                <a:ln w="0"/>
+                <a:solidFill>
+                  <a:schemeClr val="tx1"/>
+                </a:solidFill>
+                <a:effectLst>
+                  <a:outerShdw blurRad="38100" dist="19050" dir="2700000" algn="tl" rotWithShape="0">
+                    <a:schemeClr val="dk1">
+                      <a:alpha val="40000"/>
+                    </a:schemeClr>
+                  </a:outerShdw>
+                </a:effectLst>
+              </a:rPr>
+              <a:t>activity</a:t>
+            </a:r>
+            <a:endParaRPr lang="en-US" sz="1400" dirty="0">
+              <a:ln w="0"/>
+              <a:solidFill>
+                <a:schemeClr val="tx1"/>
+              </a:solidFill>
+              <a:effectLst>
+                <a:outerShdw blurRad="38100" dist="19050" dir="2700000" algn="tl" rotWithShape="0">
+                  <a:schemeClr val="dk1">
+                    <a:alpha val="40000"/>
+                  </a:schemeClr>
+                </a:outerShdw>
+              </a:effectLst>
+            </a:endParaRPr>
+          </a:p>
+        </p:txBody>
+      </p:sp>
+      <p:sp>
+        <p:nvSpPr>
+          <p:cNvPr id="13" name="Rectangle 12"/>
+          <p:cNvSpPr/>
+          <p:nvPr/>
+        </p:nvSpPr>
+        <p:spPr bwMode="auto">
+          <a:xfrm>
+            <a:off x="3106866" y="4606880"/>
+            <a:ext cx="1828800" cy="640080"/>
+          </a:xfrm>
+          <a:prstGeom prst="rect">
+            <a:avLst/>
+          </a:prstGeom>
+          <a:ln>
+            <a:headEnd/>
+            <a:tailEnd/>
+          </a:ln>
+        </p:spPr>
+        <p:style>
+          <a:lnRef idx="2">
+            <a:schemeClr val="dk1"/>
+          </a:lnRef>
+          <a:fillRef idx="1">
+            <a:schemeClr val="lt1"/>
+          </a:fillRef>
+          <a:effectRef idx="0">
+            <a:schemeClr val="dk1"/>
+          </a:effectRef>
+          <a:fontRef idx="minor">
+            <a:schemeClr val="dk1"/>
+          </a:fontRef>
+        </p:style>
+        <p:txBody>
+          <a:bodyPr wrap="none" rtlCol="0" anchor="ctr"/>
+          <a:lstStyle/>
+          <a:p>
+            <a:pPr algn="ctr"/>
+            <a:r>
+              <a:rPr lang="en-US" sz="2000" dirty="0" smtClean="0">
+                <a:ln w="0"/>
+                <a:solidFill>
+                  <a:schemeClr val="tx1"/>
+                </a:solidFill>
+                <a:effectLst>
+                  <a:outerShdw blurRad="38100" dist="19050" dir="2700000" algn="tl" rotWithShape="0">
+                    <a:schemeClr val="dk1">
+                      <a:alpha val="40000"/>
+                    </a:schemeClr>
+                  </a:outerShdw>
+                </a:effectLst>
+                <a:latin typeface="+mn-lt"/>
+              </a:rPr>
+              <a:t>Human</a:t>
+            </a:r>
+          </a:p>
+          <a:p>
+            <a:pPr algn="ctr"/>
+            <a:r>
+              <a:rPr lang="en-US" sz="2000" dirty="0" smtClean="0">
+                <a:ln w="0"/>
+                <a:solidFill>
+                  <a:schemeClr val="tx1"/>
+                </a:solidFill>
+                <a:effectLst>
+                  <a:outerShdw blurRad="38100" dist="19050" dir="2700000" algn="tl" rotWithShape="0">
+                    <a:schemeClr val="dk1">
+                      <a:alpha val="40000"/>
+                    </a:schemeClr>
+                  </a:outerShdw>
+                </a:effectLst>
+                <a:latin typeface="+mn-lt"/>
+              </a:rPr>
+              <a:t>trespassing</a:t>
+            </a:r>
+            <a:endParaRPr lang="en-US" sz="1400" dirty="0" smtClean="0">
+              <a:ln w="0"/>
+              <a:solidFill>
+                <a:schemeClr val="tx1"/>
+              </a:solidFill>
+              <a:effectLst>
+                <a:outerShdw blurRad="38100" dist="19050" dir="2700000" algn="tl" rotWithShape="0">
+                  <a:schemeClr val="dk1">
+                    <a:alpha val="40000"/>
+                  </a:schemeClr>
+                </a:outerShdw>
+              </a:effectLst>
+              <a:latin typeface="+mn-lt"/>
+            </a:endParaRPr>
+          </a:p>
+        </p:txBody>
+      </p:sp>
+      <p:cxnSp>
+        <p:nvCxnSpPr>
+          <p:cNvPr id="15" name="Straight Arrow Connector 14"/>
+          <p:cNvCxnSpPr>
+            <a:stCxn id="7" idx="2"/>
+          </p:cNvCxnSpPr>
+          <p:nvPr/>
+        </p:nvCxnSpPr>
+        <p:spPr>
+          <a:xfrm flipH="1">
+            <a:off x="6764466" y="2279561"/>
+            <a:ext cx="908034" cy="906251"/>
+          </a:xfrm>
+          <a:prstGeom prst="straightConnector1">
+            <a:avLst/>
+          </a:prstGeom>
+          <a:ln>
+            <a:tailEnd type="triangle"/>
+          </a:ln>
+        </p:spPr>
+        <p:style>
+          <a:lnRef idx="2">
+            <a:schemeClr val="dk1"/>
+          </a:lnRef>
+          <a:fillRef idx="1">
+            <a:schemeClr val="lt1"/>
+          </a:fillRef>
+          <a:effectRef idx="0">
+            <a:schemeClr val="dk1"/>
+          </a:effectRef>
+          <a:fontRef idx="minor">
+            <a:schemeClr val="dk1"/>
+          </a:fontRef>
+        </p:style>
+      </p:cxnSp>
+      <p:cxnSp>
+        <p:nvCxnSpPr>
+          <p:cNvPr id="16" name="Straight Arrow Connector 15"/>
+          <p:cNvCxnSpPr>
+            <a:stCxn id="7" idx="2"/>
+          </p:cNvCxnSpPr>
+          <p:nvPr/>
+        </p:nvCxnSpPr>
+        <p:spPr>
+          <a:xfrm>
+            <a:off x="7672500" y="2279561"/>
+            <a:ext cx="912700" cy="864111"/>
+          </a:xfrm>
+          <a:prstGeom prst="straightConnector1">
+            <a:avLst/>
+          </a:prstGeom>
+          <a:ln>
+            <a:tailEnd type="triangle"/>
+          </a:ln>
+        </p:spPr>
+        <p:style>
+          <a:lnRef idx="2">
+            <a:schemeClr val="dk1"/>
+          </a:lnRef>
+          <a:fillRef idx="1">
+            <a:schemeClr val="lt1"/>
+          </a:fillRef>
+          <a:effectRef idx="0">
+            <a:schemeClr val="dk1"/>
+          </a:effectRef>
+          <a:fontRef idx="minor">
+            <a:schemeClr val="dk1"/>
+          </a:fontRef>
+        </p:style>
+      </p:cxnSp>
+      <p:cxnSp>
+        <p:nvCxnSpPr>
+          <p:cNvPr id="19" name="Straight Arrow Connector 18"/>
+          <p:cNvCxnSpPr/>
+          <p:nvPr/>
+        </p:nvCxnSpPr>
+        <p:spPr>
+          <a:xfrm flipH="1">
+            <a:off x="4949705" y="3738252"/>
+            <a:ext cx="902063" cy="900289"/>
+          </a:xfrm>
+          <a:prstGeom prst="straightConnector1">
+            <a:avLst/>
+          </a:prstGeom>
+          <a:ln>
+            <a:tailEnd type="triangle"/>
+          </a:ln>
+        </p:spPr>
+        <p:style>
+          <a:lnRef idx="2">
+            <a:schemeClr val="dk1"/>
+          </a:lnRef>
+          <a:fillRef idx="1">
+            <a:schemeClr val="lt1"/>
+          </a:fillRef>
+          <a:effectRef idx="0">
+            <a:schemeClr val="dk1"/>
+          </a:effectRef>
+          <a:fontRef idx="minor">
+            <a:schemeClr val="dk1"/>
+          </a:fontRef>
+        </p:style>
+      </p:cxnSp>
+      <p:cxnSp>
+        <p:nvCxnSpPr>
+          <p:cNvPr id="20" name="Straight Arrow Connector 19"/>
+          <p:cNvCxnSpPr/>
+          <p:nvPr/>
+        </p:nvCxnSpPr>
+        <p:spPr>
+          <a:xfrm>
+            <a:off x="5851766" y="3738252"/>
+            <a:ext cx="912700" cy="864111"/>
+          </a:xfrm>
+          <a:prstGeom prst="straightConnector1">
+            <a:avLst/>
+          </a:prstGeom>
+          <a:ln>
+            <a:tailEnd type="triangle"/>
+          </a:ln>
+        </p:spPr>
+        <p:style>
+          <a:lnRef idx="2">
+            <a:schemeClr val="dk1"/>
+          </a:lnRef>
+          <a:fillRef idx="1">
+            <a:schemeClr val="lt1"/>
+          </a:fillRef>
+          <a:effectRef idx="0">
+            <a:schemeClr val="dk1"/>
+          </a:effectRef>
+          <a:fontRef idx="minor">
+            <a:schemeClr val="dk1"/>
+          </a:fontRef>
+        </p:style>
+      </p:cxnSp>
+      <p:sp>
+        <p:nvSpPr>
+          <p:cNvPr id="22" name="Left Brace 21"/>
+          <p:cNvSpPr/>
+          <p:nvPr/>
+        </p:nvSpPr>
+        <p:spPr>
+          <a:xfrm>
+            <a:off x="2019300" y="1697681"/>
+            <a:ext cx="419100" cy="1705919"/>
+          </a:xfrm>
+          <a:prstGeom prst="leftBrace">
+            <a:avLst>
+              <a:gd name="adj1" fmla="val 40591"/>
+              <a:gd name="adj2" fmla="val 50000"/>
+            </a:avLst>
+          </a:prstGeom>
+        </p:spPr>
+        <p:style>
+          <a:lnRef idx="2">
+            <a:schemeClr val="dk1"/>
+          </a:lnRef>
+          <a:fillRef idx="1">
+            <a:schemeClr val="lt1"/>
+          </a:fillRef>
+          <a:effectRef idx="0">
+            <a:schemeClr val="dk1"/>
+          </a:effectRef>
+          <a:fontRef idx="minor">
+            <a:schemeClr val="dk1"/>
+          </a:fontRef>
+        </p:style>
+        <p:txBody>
+          <a:bodyPr rtlCol="0" anchor="ctr"/>
+          <a:lstStyle/>
+          <a:p>
+            <a:pPr algn="ctr"/>
+            <a:endParaRPr lang="en-US">
+              <a:ln w="0"/>
+              <a:solidFill>
+                <a:schemeClr val="tx1"/>
+              </a:solidFill>
+              <a:effectLst>
+                <a:outerShdw blurRad="38100" dist="19050" dir="2700000" algn="tl" rotWithShape="0">
+                  <a:schemeClr val="dk1">
+                    <a:alpha val="40000"/>
+                  </a:schemeClr>
+                </a:outerShdw>
+              </a:effectLst>
+            </a:endParaRPr>
+          </a:p>
+        </p:txBody>
+      </p:sp>
+      <p:sp>
+        <p:nvSpPr>
+          <p:cNvPr id="23" name="Left Brace 22"/>
+          <p:cNvSpPr/>
+          <p:nvPr/>
+        </p:nvSpPr>
+        <p:spPr>
+          <a:xfrm>
+            <a:off x="2019300" y="3434612"/>
+            <a:ext cx="419100" cy="1812348"/>
+          </a:xfrm>
+          <a:prstGeom prst="leftBrace">
+            <a:avLst>
+              <a:gd name="adj1" fmla="val 40591"/>
+              <a:gd name="adj2" fmla="val 50000"/>
+            </a:avLst>
+          </a:prstGeom>
+        </p:spPr>
+        <p:style>
+          <a:lnRef idx="2">
+            <a:schemeClr val="dk1"/>
+          </a:lnRef>
+          <a:fillRef idx="1">
+            <a:schemeClr val="lt1"/>
+          </a:fillRef>
+          <a:effectRef idx="0">
+            <a:schemeClr val="dk1"/>
+          </a:effectRef>
+          <a:fontRef idx="minor">
+            <a:schemeClr val="dk1"/>
+          </a:fontRef>
+        </p:style>
+        <p:txBody>
+          <a:bodyPr rtlCol="0" anchor="ctr"/>
+          <a:lstStyle/>
+          <a:p>
+            <a:pPr algn="ctr"/>
+            <a:endParaRPr lang="en-US">
+              <a:ln w="0"/>
+              <a:solidFill>
+                <a:schemeClr val="tx1"/>
+              </a:solidFill>
+              <a:effectLst>
+                <a:outerShdw blurRad="38100" dist="19050" dir="2700000" algn="tl" rotWithShape="0">
+                  <a:schemeClr val="dk1">
+                    <a:alpha val="40000"/>
+                  </a:schemeClr>
+                </a:outerShdw>
+              </a:effectLst>
+            </a:endParaRPr>
+          </a:p>
+        </p:txBody>
+      </p:sp>
+      <p:sp>
+        <p:nvSpPr>
+          <p:cNvPr id="24" name="TextBox 23"/>
+          <p:cNvSpPr txBox="1"/>
+          <p:nvPr/>
+        </p:nvSpPr>
+        <p:spPr>
+          <a:xfrm>
+            <a:off x="572606" y="2271240"/>
+            <a:ext cx="1422400" cy="558800"/>
+          </a:xfrm>
+          <a:prstGeom prst="rect">
+            <a:avLst/>
+          </a:prstGeom>
+          <a:ln>
+            <a:noFill/>
+          </a:ln>
+        </p:spPr>
+        <p:style>
+          <a:lnRef idx="2">
+            <a:schemeClr val="dk1"/>
+          </a:lnRef>
+          <a:fillRef idx="1">
+            <a:schemeClr val="lt1"/>
+          </a:fillRef>
+          <a:effectRef idx="0">
+            <a:schemeClr val="dk1"/>
+          </a:effectRef>
+          <a:fontRef idx="minor">
+            <a:schemeClr val="dk1"/>
+          </a:fontRef>
+        </p:style>
+        <p:txBody>
+          <a:bodyPr wrap="none" rtlCol="0">
+            <a:noAutofit/>
+          </a:bodyPr>
+          <a:lstStyle/>
+          <a:p>
+            <a:pPr algn="ctr"/>
+            <a:r>
+              <a:rPr lang="en-US" sz="2800" dirty="0" smtClean="0">
+                <a:ln w="0"/>
+                <a:solidFill>
+                  <a:schemeClr val="tx1"/>
+                </a:solidFill>
+                <a:effectLst>
+                  <a:outerShdw blurRad="38100" dist="19050" dir="2700000" algn="tl" rotWithShape="0">
+                    <a:schemeClr val="dk1">
+                      <a:alpha val="40000"/>
+                    </a:schemeClr>
+                  </a:outerShdw>
+                </a:effectLst>
+              </a:rPr>
+              <a:t>Stage 1</a:t>
+            </a:r>
+            <a:endParaRPr lang="en-US" sz="1600" dirty="0" smtClean="0">
+              <a:ln w="0"/>
+              <a:solidFill>
+                <a:schemeClr val="tx1"/>
+              </a:solidFill>
+              <a:effectLst>
+                <a:outerShdw blurRad="38100" dist="19050" dir="2700000" algn="tl" rotWithShape="0">
+                  <a:schemeClr val="dk1">
+                    <a:alpha val="40000"/>
+                  </a:schemeClr>
+                </a:outerShdw>
+              </a:effectLst>
+            </a:endParaRPr>
+          </a:p>
+        </p:txBody>
+      </p:sp>
+      <p:sp>
+        <p:nvSpPr>
+          <p:cNvPr id="26" name="TextBox 25"/>
+          <p:cNvSpPr txBox="1"/>
+          <p:nvPr/>
+        </p:nvSpPr>
+        <p:spPr>
+          <a:xfrm>
+            <a:off x="572606" y="4079741"/>
+            <a:ext cx="1422400" cy="558800"/>
+          </a:xfrm>
+          <a:prstGeom prst="rect">
+            <a:avLst/>
+          </a:prstGeom>
+          <a:ln>
+            <a:noFill/>
+          </a:ln>
+        </p:spPr>
+        <p:style>
+          <a:lnRef idx="2">
+            <a:schemeClr val="dk1"/>
+          </a:lnRef>
+          <a:fillRef idx="1">
+            <a:schemeClr val="lt1"/>
+          </a:fillRef>
+          <a:effectRef idx="0">
+            <a:schemeClr val="dk1"/>
+          </a:effectRef>
+          <a:fontRef idx="minor">
+            <a:schemeClr val="dk1"/>
+          </a:fontRef>
+        </p:style>
+        <p:txBody>
+          <a:bodyPr wrap="none" rtlCol="0">
+            <a:noAutofit/>
+          </a:bodyPr>
+          <a:lstStyle/>
+          <a:p>
+            <a:pPr algn="ctr"/>
+            <a:r>
+              <a:rPr lang="en-US" sz="2800" dirty="0" smtClean="0">
+                <a:ln w="0"/>
+                <a:solidFill>
+                  <a:schemeClr val="tx1"/>
+                </a:solidFill>
+                <a:effectLst>
+                  <a:outerShdw blurRad="38100" dist="19050" dir="2700000" algn="tl" rotWithShape="0">
+                    <a:schemeClr val="dk1">
+                      <a:alpha val="40000"/>
+                    </a:schemeClr>
+                  </a:outerShdw>
+                </a:effectLst>
+              </a:rPr>
+              <a:t>Stage 2</a:t>
+            </a:r>
+            <a:endParaRPr lang="en-US" sz="1600" dirty="0" smtClean="0">
+              <a:ln w="0"/>
+              <a:solidFill>
+                <a:schemeClr val="tx1"/>
+              </a:solidFill>
+              <a:effectLst>
+                <a:outerShdw blurRad="38100" dist="19050" dir="2700000" algn="tl" rotWithShape="0">
+                  <a:schemeClr val="dk1">
+                    <a:alpha val="40000"/>
+                  </a:schemeClr>
+                </a:outerShdw>
+              </a:effectLst>
+            </a:endParaRPr>
+          </a:p>
+        </p:txBody>
+      </p:sp>
+    </p:spTree>
+    <p:extLst>
+      <p:ext uri="{BB962C8B-B14F-4D97-AF65-F5344CB8AC3E}">
+        <p14:creationId xmlns:p14="http://schemas.microsoft.com/office/powerpoint/2010/main" val="56781743"/>
+      </p:ext>
+    </p:extLst>
+  </p:cSld>
+  <p:clrMapOvr>
+    <a:masterClrMapping/>
+  </p:clrMapOvr>
+  <p:timing>
+    <p:tnLst>
+      <p:par>
+        <p:cTn id="1" dur="indefinite" restart="never" nodeType="tmRoot"/>
+      </p:par>
+    </p:tnLst>
+  </p:timing>
+</p:sld>
+</file>
+
+<file path=ppt/slides/slide10.xml><?xml version="1.0" encoding="utf-8"?>
+<p:sld xmlns:a="http://schemas.openxmlformats.org/drawingml/2006/main" xmlns:r="http://schemas.openxmlformats.org/officeDocument/2006/relationships" xmlns:p="http://schemas.openxmlformats.org/presentationml/2006/main">
+  <p:cSld>
+    <p:spTree>
+      <p:nvGrpSpPr>
+        <p:cNvPr id="1" name=""/>
+        <p:cNvGrpSpPr/>
+        <p:nvPr/>
+      </p:nvGrpSpPr>
+      <p:grpSpPr>
+        <a:xfrm>
+          <a:off x="0" y="0"/>
+          <a:ext cx="0" cy="0"/>
+          <a:chOff x="0" y="0"/>
+          <a:chExt cx="0" cy="0"/>
+        </a:xfrm>
+      </p:grpSpPr>
+      <p:sp>
+        <p:nvSpPr>
+          <p:cNvPr id="4" name="Rectangle 3"/>
+          <p:cNvSpPr/>
+          <p:nvPr/>
+        </p:nvSpPr>
+        <p:spPr bwMode="auto">
+          <a:xfrm>
+            <a:off x="2370617" y="3811698"/>
+            <a:ext cx="3426894" cy="510363"/>
+          </a:xfrm>
+          <a:prstGeom prst="rect">
+            <a:avLst/>
+          </a:prstGeom>
+          <a:pattFill prst="wdUpDiag">
+            <a:fgClr>
+              <a:schemeClr val="tx1"/>
+            </a:fgClr>
+            <a:bgClr>
+              <a:schemeClr val="bg1"/>
+            </a:bgClr>
+          </a:pattFill>
+          <a:ln>
+            <a:headEnd/>
+            <a:tailEnd/>
+          </a:ln>
+        </p:spPr>
+        <p:style>
+          <a:lnRef idx="2">
+            <a:schemeClr val="dk1"/>
+          </a:lnRef>
+          <a:fillRef idx="1">
+            <a:schemeClr val="lt1"/>
+          </a:fillRef>
+          <a:effectRef idx="0">
+            <a:schemeClr val="dk1"/>
+          </a:effectRef>
+          <a:fontRef idx="minor">
+            <a:schemeClr val="dk1"/>
+          </a:fontRef>
+        </p:style>
+        <p:txBody>
+          <a:bodyPr wrap="none" rtlCol="0" anchor="ctr"/>
+          <a:lstStyle/>
+          <a:p>
+            <a:pPr algn="ctr"/>
+            <a:endParaRPr lang="en-US" sz="1600" dirty="0">
+              <a:ln w="0"/>
+              <a:effectLst>
+                <a:outerShdw blurRad="38100" dist="19050" dir="2700000" algn="tl" rotWithShape="0">
+                  <a:schemeClr val="dk1">
+                    <a:alpha val="40000"/>
+                  </a:schemeClr>
+                </a:outerShdw>
+              </a:effectLst>
+            </a:endParaRPr>
+          </a:p>
+        </p:txBody>
+      </p:sp>
+      <p:cxnSp>
+        <p:nvCxnSpPr>
+          <p:cNvPr id="5" name="Straight Connector 4"/>
+          <p:cNvCxnSpPr/>
+          <p:nvPr/>
+        </p:nvCxnSpPr>
+        <p:spPr>
+          <a:xfrm>
+            <a:off x="3302738" y="3811698"/>
+            <a:ext cx="0" cy="510363"/>
+          </a:xfrm>
+          <a:prstGeom prst="line">
+            <a:avLst/>
+          </a:prstGeom>
+          <a:ln/>
+        </p:spPr>
+        <p:style>
+          <a:lnRef idx="2">
+            <a:schemeClr val="dk1"/>
+          </a:lnRef>
+          <a:fillRef idx="1">
+            <a:schemeClr val="lt1"/>
+          </a:fillRef>
+          <a:effectRef idx="0">
+            <a:schemeClr val="dk1"/>
+          </a:effectRef>
+          <a:fontRef idx="minor">
+            <a:schemeClr val="dk1"/>
+          </a:fontRef>
+        </p:style>
+      </p:cxnSp>
+      <p:cxnSp>
+        <p:nvCxnSpPr>
+          <p:cNvPr id="6" name="Straight Connector 5"/>
+          <p:cNvCxnSpPr/>
+          <p:nvPr/>
+        </p:nvCxnSpPr>
+        <p:spPr>
+          <a:xfrm>
+            <a:off x="4226663" y="3811698"/>
+            <a:ext cx="0" cy="510363"/>
+          </a:xfrm>
+          <a:prstGeom prst="line">
+            <a:avLst/>
+          </a:prstGeom>
+          <a:ln/>
+        </p:spPr>
+        <p:style>
+          <a:lnRef idx="2">
+            <a:schemeClr val="dk1"/>
+          </a:lnRef>
+          <a:fillRef idx="1">
+            <a:schemeClr val="lt1"/>
+          </a:fillRef>
+          <a:effectRef idx="0">
+            <a:schemeClr val="dk1"/>
+          </a:effectRef>
+          <a:fontRef idx="minor">
+            <a:schemeClr val="dk1"/>
+          </a:fontRef>
+        </p:style>
+      </p:cxnSp>
+      <p:cxnSp>
+        <p:nvCxnSpPr>
+          <p:cNvPr id="7" name="Straight Connector 6"/>
+          <p:cNvCxnSpPr/>
+          <p:nvPr/>
+        </p:nvCxnSpPr>
+        <p:spPr>
+          <a:xfrm>
+            <a:off x="5141063" y="3811698"/>
+            <a:ext cx="0" cy="510363"/>
+          </a:xfrm>
+          <a:prstGeom prst="line">
+            <a:avLst/>
+          </a:prstGeom>
+          <a:ln/>
+        </p:spPr>
+        <p:style>
+          <a:lnRef idx="2">
+            <a:schemeClr val="dk1"/>
+          </a:lnRef>
+          <a:fillRef idx="1">
+            <a:schemeClr val="lt1"/>
+          </a:fillRef>
+          <a:effectRef idx="0">
+            <a:schemeClr val="dk1"/>
+          </a:effectRef>
+          <a:fontRef idx="minor">
+            <a:schemeClr val="dk1"/>
+          </a:fontRef>
+        </p:style>
+      </p:cxnSp>
+      <p:sp>
+        <p:nvSpPr>
+          <p:cNvPr id="8" name="TextBox 7"/>
+          <p:cNvSpPr txBox="1"/>
+          <p:nvPr/>
+        </p:nvSpPr>
+        <p:spPr>
+          <a:xfrm>
+            <a:off x="2655592" y="3890666"/>
+            <a:ext cx="390525" cy="333375"/>
+          </a:xfrm>
+          <a:prstGeom prst="rect">
+            <a:avLst/>
+          </a:prstGeom>
+          <a:ln>
+            <a:noFill/>
+          </a:ln>
+        </p:spPr>
+        <p:style>
+          <a:lnRef idx="2">
+            <a:schemeClr val="dk1"/>
+          </a:lnRef>
+          <a:fillRef idx="1">
+            <a:schemeClr val="lt1"/>
+          </a:fillRef>
+          <a:effectRef idx="0">
+            <a:schemeClr val="dk1"/>
+          </a:effectRef>
+          <a:fontRef idx="minor">
+            <a:schemeClr val="dk1"/>
+          </a:fontRef>
+        </p:style>
+        <p:txBody>
+          <a:bodyPr wrap="none" rtlCol="0">
+            <a:noAutofit/>
+          </a:bodyPr>
+          <a:lstStyle/>
+          <a:p>
+            <a:pPr algn="ctr"/>
+            <a:r>
+              <a:rPr lang="en-US" sz="1600" dirty="0" smtClean="0">
+                <a:ln w="0"/>
+                <a:effectLst>
+                  <a:outerShdw blurRad="38100" dist="19050" dir="2700000" algn="tl" rotWithShape="0">
+                    <a:schemeClr val="dk1">
+                      <a:alpha val="40000"/>
+                    </a:schemeClr>
+                  </a:outerShdw>
+                </a:effectLst>
+              </a:rPr>
+              <a:t>1</a:t>
+            </a:r>
+          </a:p>
+        </p:txBody>
+      </p:sp>
+      <p:sp>
+        <p:nvSpPr>
+          <p:cNvPr id="9" name="TextBox 8"/>
+          <p:cNvSpPr txBox="1"/>
+          <p:nvPr/>
+        </p:nvSpPr>
+        <p:spPr>
+          <a:xfrm>
+            <a:off x="3587713" y="3890666"/>
+            <a:ext cx="390525" cy="333375"/>
+          </a:xfrm>
+          <a:prstGeom prst="rect">
+            <a:avLst/>
+          </a:prstGeom>
+          <a:ln>
+            <a:noFill/>
+          </a:ln>
+        </p:spPr>
+        <p:style>
+          <a:lnRef idx="2">
+            <a:schemeClr val="dk1"/>
+          </a:lnRef>
+          <a:fillRef idx="1">
+            <a:schemeClr val="lt1"/>
+          </a:fillRef>
+          <a:effectRef idx="0">
+            <a:schemeClr val="dk1"/>
+          </a:effectRef>
+          <a:fontRef idx="minor">
+            <a:schemeClr val="dk1"/>
+          </a:fontRef>
+        </p:style>
+        <p:txBody>
+          <a:bodyPr wrap="none" rtlCol="0">
+            <a:noAutofit/>
+          </a:bodyPr>
+          <a:lstStyle/>
+          <a:p>
+            <a:pPr algn="ctr"/>
+            <a:r>
+              <a:rPr lang="en-US" sz="1600" dirty="0" smtClean="0">
+                <a:ln w="0"/>
+                <a:effectLst>
+                  <a:outerShdw blurRad="38100" dist="19050" dir="2700000" algn="tl" rotWithShape="0">
+                    <a:schemeClr val="dk1">
+                      <a:alpha val="40000"/>
+                    </a:schemeClr>
+                  </a:outerShdw>
+                </a:effectLst>
+              </a:rPr>
+              <a:t>2</a:t>
+            </a:r>
+          </a:p>
+        </p:txBody>
+      </p:sp>
+      <p:sp>
+        <p:nvSpPr>
+          <p:cNvPr id="10" name="TextBox 9"/>
+          <p:cNvSpPr txBox="1"/>
+          <p:nvPr/>
+        </p:nvSpPr>
+        <p:spPr>
+          <a:xfrm>
+            <a:off x="4502112" y="3890666"/>
+            <a:ext cx="390525" cy="333375"/>
+          </a:xfrm>
+          <a:prstGeom prst="rect">
+            <a:avLst/>
+          </a:prstGeom>
+          <a:ln>
+            <a:noFill/>
+          </a:ln>
+        </p:spPr>
+        <p:style>
+          <a:lnRef idx="2">
+            <a:schemeClr val="dk1"/>
+          </a:lnRef>
+          <a:fillRef idx="1">
+            <a:schemeClr val="lt1"/>
+          </a:fillRef>
+          <a:effectRef idx="0">
+            <a:schemeClr val="dk1"/>
+          </a:effectRef>
+          <a:fontRef idx="minor">
+            <a:schemeClr val="dk1"/>
+          </a:fontRef>
+        </p:style>
+        <p:txBody>
+          <a:bodyPr wrap="none" rtlCol="0">
+            <a:noAutofit/>
+          </a:bodyPr>
+          <a:lstStyle/>
+          <a:p>
+            <a:pPr algn="ctr"/>
+            <a:r>
+              <a:rPr lang="en-US" sz="1600" dirty="0" smtClean="0">
+                <a:ln w="0"/>
+                <a:effectLst>
+                  <a:outerShdw blurRad="38100" dist="19050" dir="2700000" algn="tl" rotWithShape="0">
+                    <a:schemeClr val="dk1">
+                      <a:alpha val="40000"/>
+                    </a:schemeClr>
+                  </a:outerShdw>
+                </a:effectLst>
+              </a:rPr>
+              <a:t>3</a:t>
+            </a:r>
+          </a:p>
+        </p:txBody>
+      </p:sp>
+      <p:sp>
+        <p:nvSpPr>
+          <p:cNvPr id="11" name="TextBox 10"/>
+          <p:cNvSpPr txBox="1"/>
+          <p:nvPr/>
+        </p:nvSpPr>
+        <p:spPr>
+          <a:xfrm>
+            <a:off x="5406986" y="3890666"/>
+            <a:ext cx="390525" cy="333375"/>
+          </a:xfrm>
+          <a:prstGeom prst="rect">
+            <a:avLst/>
+          </a:prstGeom>
+          <a:ln>
+            <a:noFill/>
+          </a:ln>
+        </p:spPr>
+        <p:style>
+          <a:lnRef idx="2">
+            <a:schemeClr val="dk1"/>
+          </a:lnRef>
+          <a:fillRef idx="1">
+            <a:schemeClr val="lt1"/>
+          </a:fillRef>
+          <a:effectRef idx="0">
+            <a:schemeClr val="dk1"/>
+          </a:effectRef>
+          <a:fontRef idx="minor">
+            <a:schemeClr val="dk1"/>
+          </a:fontRef>
+        </p:style>
+        <p:txBody>
+          <a:bodyPr wrap="none" rtlCol="0">
+            <a:noAutofit/>
+          </a:bodyPr>
+          <a:lstStyle/>
+          <a:p>
+            <a:pPr algn="ctr"/>
+            <a:r>
+              <a:rPr lang="en-US" sz="1600" dirty="0" smtClean="0">
+                <a:ln w="0"/>
+                <a:effectLst>
+                  <a:outerShdw blurRad="38100" dist="19050" dir="2700000" algn="tl" rotWithShape="0">
+                    <a:schemeClr val="dk1">
+                      <a:alpha val="40000"/>
+                    </a:schemeClr>
+                  </a:outerShdw>
+                </a:effectLst>
+              </a:rPr>
+              <a:t>4</a:t>
+            </a:r>
+          </a:p>
+        </p:txBody>
+      </p:sp>
+      <p:sp>
+        <p:nvSpPr>
+          <p:cNvPr id="12" name="Rectangle 11"/>
+          <p:cNvSpPr/>
+          <p:nvPr/>
+        </p:nvSpPr>
+        <p:spPr bwMode="auto">
+          <a:xfrm>
+            <a:off x="3304067" y="4623265"/>
+            <a:ext cx="932121" cy="510363"/>
+          </a:xfrm>
+          <a:prstGeom prst="rect">
+            <a:avLst/>
+          </a:prstGeom>
+          <a:pattFill prst="wdUpDiag">
+            <a:fgClr>
+              <a:schemeClr val="tx1"/>
+            </a:fgClr>
+            <a:bgClr>
+              <a:schemeClr val="bg1"/>
+            </a:bgClr>
+          </a:pattFill>
+          <a:ln>
+            <a:headEnd/>
+            <a:tailEnd/>
+          </a:ln>
+        </p:spPr>
+        <p:style>
+          <a:lnRef idx="2">
+            <a:schemeClr val="dk1"/>
+          </a:lnRef>
+          <a:fillRef idx="1">
+            <a:schemeClr val="lt1"/>
+          </a:fillRef>
+          <a:effectRef idx="0">
+            <a:schemeClr val="dk1"/>
+          </a:effectRef>
+          <a:fontRef idx="minor">
+            <a:schemeClr val="dk1"/>
+          </a:fontRef>
+        </p:style>
+        <p:txBody>
+          <a:bodyPr wrap="none" rtlCol="0" anchor="ctr"/>
+          <a:lstStyle/>
+          <a:p>
+            <a:pPr algn="ctr"/>
+            <a:endParaRPr lang="en-US" sz="1600" dirty="0">
+              <a:ln w="0"/>
+              <a:effectLst>
+                <a:outerShdw blurRad="38100" dist="19050" dir="2700000" algn="tl" rotWithShape="0">
+                  <a:schemeClr val="dk1">
+                    <a:alpha val="40000"/>
+                  </a:schemeClr>
+                </a:outerShdw>
+              </a:effectLst>
+            </a:endParaRPr>
+          </a:p>
+        </p:txBody>
+      </p:sp>
+      <p:sp>
+        <p:nvSpPr>
+          <p:cNvPr id="13" name="Rectangle 12"/>
+          <p:cNvSpPr/>
+          <p:nvPr/>
+        </p:nvSpPr>
+        <p:spPr bwMode="auto">
+          <a:xfrm>
+            <a:off x="5130984" y="4623265"/>
+            <a:ext cx="932121" cy="510363"/>
+          </a:xfrm>
+          <a:prstGeom prst="rect">
+            <a:avLst/>
+          </a:prstGeom>
+          <a:pattFill prst="wdUpDiag">
+            <a:fgClr>
+              <a:schemeClr val="tx1"/>
+            </a:fgClr>
+            <a:bgClr>
+              <a:schemeClr val="bg1"/>
+            </a:bgClr>
+          </a:pattFill>
+          <a:ln>
+            <a:headEnd/>
+            <a:tailEnd/>
+          </a:ln>
+        </p:spPr>
+        <p:style>
+          <a:lnRef idx="2">
+            <a:schemeClr val="dk1"/>
+          </a:lnRef>
+          <a:fillRef idx="1">
+            <a:schemeClr val="lt1"/>
+          </a:fillRef>
+          <a:effectRef idx="0">
+            <a:schemeClr val="dk1"/>
+          </a:effectRef>
+          <a:fontRef idx="minor">
+            <a:schemeClr val="dk1"/>
+          </a:fontRef>
+        </p:style>
+        <p:txBody>
+          <a:bodyPr wrap="none" rtlCol="0" anchor="ctr"/>
+          <a:lstStyle/>
+          <a:p>
+            <a:pPr algn="ctr"/>
+            <a:endParaRPr lang="en-US" sz="1600" dirty="0">
+              <a:ln w="0"/>
+              <a:effectLst>
+                <a:outerShdw blurRad="38100" dist="19050" dir="2700000" algn="tl" rotWithShape="0">
+                  <a:schemeClr val="dk1">
+                    <a:alpha val="40000"/>
+                  </a:schemeClr>
+                </a:outerShdw>
+              </a:effectLst>
+            </a:endParaRPr>
+          </a:p>
+        </p:txBody>
+      </p:sp>
+      <p:sp>
+        <p:nvSpPr>
+          <p:cNvPr id="14" name="Rectangle 13"/>
+          <p:cNvSpPr/>
+          <p:nvPr/>
+        </p:nvSpPr>
+        <p:spPr bwMode="auto">
+          <a:xfrm>
+            <a:off x="6949925" y="4623265"/>
+            <a:ext cx="932121" cy="510363"/>
+          </a:xfrm>
+          <a:prstGeom prst="rect">
+            <a:avLst/>
+          </a:prstGeom>
+          <a:pattFill prst="wdUpDiag">
+            <a:fgClr>
+              <a:schemeClr val="tx1"/>
+            </a:fgClr>
+            <a:bgClr>
+              <a:schemeClr val="bg1"/>
+            </a:bgClr>
+          </a:pattFill>
+          <a:ln>
+            <a:headEnd/>
+            <a:tailEnd/>
+          </a:ln>
+        </p:spPr>
+        <p:style>
+          <a:lnRef idx="2">
+            <a:schemeClr val="dk1"/>
+          </a:lnRef>
+          <a:fillRef idx="1">
+            <a:schemeClr val="lt1"/>
+          </a:fillRef>
+          <a:effectRef idx="0">
+            <a:schemeClr val="dk1"/>
+          </a:effectRef>
+          <a:fontRef idx="minor">
+            <a:schemeClr val="dk1"/>
+          </a:fontRef>
+        </p:style>
+        <p:txBody>
+          <a:bodyPr wrap="none" rtlCol="0" anchor="ctr"/>
+          <a:lstStyle/>
+          <a:p>
+            <a:pPr algn="ctr"/>
+            <a:endParaRPr lang="en-US" sz="1600" dirty="0">
+              <a:ln w="0"/>
+              <a:effectLst>
+                <a:outerShdw blurRad="38100" dist="19050" dir="2700000" algn="tl" rotWithShape="0">
+                  <a:schemeClr val="dk1">
+                    <a:alpha val="40000"/>
+                  </a:schemeClr>
+                </a:outerShdw>
+              </a:effectLst>
+            </a:endParaRPr>
+          </a:p>
+        </p:txBody>
+      </p:sp>
+      <p:sp>
+        <p:nvSpPr>
+          <p:cNvPr id="15" name="Rectangle 14"/>
+          <p:cNvSpPr/>
+          <p:nvPr/>
+        </p:nvSpPr>
+        <p:spPr bwMode="auto">
+          <a:xfrm>
+            <a:off x="8776842" y="4623265"/>
+            <a:ext cx="643383" cy="510363"/>
+          </a:xfrm>
+          <a:prstGeom prst="rect">
+            <a:avLst/>
+          </a:prstGeom>
+          <a:pattFill prst="wdUpDiag">
+            <a:fgClr>
+              <a:schemeClr val="tx1"/>
+            </a:fgClr>
+            <a:bgClr>
+              <a:schemeClr val="bg1"/>
+            </a:bgClr>
+          </a:pattFill>
+          <a:ln>
+            <a:headEnd/>
+            <a:tailEnd/>
+          </a:ln>
+        </p:spPr>
+        <p:style>
+          <a:lnRef idx="2">
+            <a:schemeClr val="dk1"/>
+          </a:lnRef>
+          <a:fillRef idx="1">
+            <a:schemeClr val="lt1"/>
+          </a:fillRef>
+          <a:effectRef idx="0">
+            <a:schemeClr val="dk1"/>
+          </a:effectRef>
+          <a:fontRef idx="minor">
+            <a:schemeClr val="dk1"/>
+          </a:fontRef>
+        </p:style>
+        <p:txBody>
+          <a:bodyPr wrap="none" rtlCol="0" anchor="ctr"/>
+          <a:lstStyle/>
+          <a:p>
+            <a:pPr algn="ctr"/>
+            <a:endParaRPr lang="en-US" sz="1600" dirty="0">
+              <a:ln w="0"/>
+              <a:effectLst>
+                <a:outerShdw blurRad="38100" dist="19050" dir="2700000" algn="tl" rotWithShape="0">
+                  <a:schemeClr val="dk1">
+                    <a:alpha val="40000"/>
+                  </a:schemeClr>
+                </a:outerShdw>
+              </a:effectLst>
+            </a:endParaRPr>
+          </a:p>
+        </p:txBody>
+      </p:sp>
+      <p:sp>
+        <p:nvSpPr>
+          <p:cNvPr id="16" name="TextBox 15"/>
+          <p:cNvSpPr txBox="1"/>
+          <p:nvPr/>
+        </p:nvSpPr>
+        <p:spPr>
+          <a:xfrm>
+            <a:off x="3589042" y="4683185"/>
+            <a:ext cx="390525" cy="333375"/>
+          </a:xfrm>
+          <a:prstGeom prst="rect">
+            <a:avLst/>
+          </a:prstGeom>
+          <a:ln>
+            <a:noFill/>
+          </a:ln>
+        </p:spPr>
+        <p:style>
+          <a:lnRef idx="2">
+            <a:schemeClr val="dk1"/>
+          </a:lnRef>
+          <a:fillRef idx="1">
+            <a:schemeClr val="lt1"/>
+          </a:fillRef>
+          <a:effectRef idx="0">
+            <a:schemeClr val="dk1"/>
+          </a:effectRef>
+          <a:fontRef idx="minor">
+            <a:schemeClr val="dk1"/>
+          </a:fontRef>
+        </p:style>
+        <p:txBody>
+          <a:bodyPr wrap="none" rtlCol="0">
+            <a:noAutofit/>
+          </a:bodyPr>
+          <a:lstStyle/>
+          <a:p>
+            <a:pPr algn="ctr"/>
+            <a:r>
+              <a:rPr lang="en-US" sz="1600" dirty="0" smtClean="0">
+                <a:ln w="0"/>
+                <a:effectLst>
+                  <a:outerShdw blurRad="38100" dist="19050" dir="2700000" algn="tl" rotWithShape="0">
+                    <a:schemeClr val="dk1">
+                      <a:alpha val="40000"/>
+                    </a:schemeClr>
+                  </a:outerShdw>
+                </a:effectLst>
+              </a:rPr>
+              <a:t>1</a:t>
+            </a:r>
+          </a:p>
+        </p:txBody>
+      </p:sp>
+      <p:sp>
+        <p:nvSpPr>
+          <p:cNvPr id="17" name="TextBox 16"/>
+          <p:cNvSpPr txBox="1"/>
+          <p:nvPr/>
+        </p:nvSpPr>
+        <p:spPr>
+          <a:xfrm>
+            <a:off x="5433679" y="4711760"/>
+            <a:ext cx="390525" cy="333375"/>
+          </a:xfrm>
+          <a:prstGeom prst="rect">
+            <a:avLst/>
+          </a:prstGeom>
+          <a:ln>
+            <a:noFill/>
+          </a:ln>
+        </p:spPr>
+        <p:style>
+          <a:lnRef idx="2">
+            <a:schemeClr val="dk1"/>
+          </a:lnRef>
+          <a:fillRef idx="1">
+            <a:schemeClr val="lt1"/>
+          </a:fillRef>
+          <a:effectRef idx="0">
+            <a:schemeClr val="dk1"/>
+          </a:effectRef>
+          <a:fontRef idx="minor">
+            <a:schemeClr val="dk1"/>
+          </a:fontRef>
+        </p:style>
+        <p:txBody>
+          <a:bodyPr wrap="none" rtlCol="0">
+            <a:noAutofit/>
+          </a:bodyPr>
+          <a:lstStyle/>
+          <a:p>
+            <a:pPr algn="ctr"/>
+            <a:r>
+              <a:rPr lang="en-US" sz="1600" dirty="0" smtClean="0">
+                <a:ln w="0"/>
+                <a:effectLst>
+                  <a:outerShdw blurRad="38100" dist="19050" dir="2700000" algn="tl" rotWithShape="0">
+                    <a:schemeClr val="dk1">
+                      <a:alpha val="40000"/>
+                    </a:schemeClr>
+                  </a:outerShdw>
+                </a:effectLst>
+              </a:rPr>
+              <a:t>2</a:t>
+            </a:r>
+          </a:p>
+        </p:txBody>
+      </p:sp>
+      <p:sp>
+        <p:nvSpPr>
+          <p:cNvPr id="18" name="TextBox 17"/>
+          <p:cNvSpPr txBox="1"/>
+          <p:nvPr/>
+        </p:nvSpPr>
+        <p:spPr>
+          <a:xfrm>
+            <a:off x="7220722" y="4711758"/>
+            <a:ext cx="390525" cy="333375"/>
+          </a:xfrm>
+          <a:prstGeom prst="rect">
+            <a:avLst/>
+          </a:prstGeom>
+          <a:ln>
+            <a:noFill/>
+          </a:ln>
+        </p:spPr>
+        <p:style>
+          <a:lnRef idx="2">
+            <a:schemeClr val="dk1"/>
+          </a:lnRef>
+          <a:fillRef idx="1">
+            <a:schemeClr val="lt1"/>
+          </a:fillRef>
+          <a:effectRef idx="0">
+            <a:schemeClr val="dk1"/>
+          </a:effectRef>
+          <a:fontRef idx="minor">
+            <a:schemeClr val="dk1"/>
+          </a:fontRef>
+        </p:style>
+        <p:txBody>
+          <a:bodyPr wrap="none" rtlCol="0">
+            <a:noAutofit/>
+          </a:bodyPr>
+          <a:lstStyle/>
+          <a:p>
+            <a:pPr algn="ctr"/>
+            <a:r>
+              <a:rPr lang="en-US" sz="1600" dirty="0" smtClean="0">
+                <a:ln w="0"/>
+                <a:effectLst>
+                  <a:outerShdw blurRad="38100" dist="19050" dir="2700000" algn="tl" rotWithShape="0">
+                    <a:schemeClr val="dk1">
+                      <a:alpha val="40000"/>
+                    </a:schemeClr>
+                  </a:outerShdw>
+                </a:effectLst>
+              </a:rPr>
+              <a:t>3</a:t>
+            </a:r>
+          </a:p>
+        </p:txBody>
+      </p:sp>
+      <p:sp>
+        <p:nvSpPr>
+          <p:cNvPr id="19" name="TextBox 18"/>
+          <p:cNvSpPr txBox="1"/>
+          <p:nvPr/>
+        </p:nvSpPr>
+        <p:spPr>
+          <a:xfrm>
+            <a:off x="8903270" y="4690766"/>
+            <a:ext cx="390525" cy="333375"/>
+          </a:xfrm>
+          <a:prstGeom prst="rect">
+            <a:avLst/>
+          </a:prstGeom>
+          <a:ln>
+            <a:noFill/>
+          </a:ln>
+        </p:spPr>
+        <p:style>
+          <a:lnRef idx="2">
+            <a:schemeClr val="dk1"/>
+          </a:lnRef>
+          <a:fillRef idx="1">
+            <a:schemeClr val="lt1"/>
+          </a:fillRef>
+          <a:effectRef idx="0">
+            <a:schemeClr val="dk1"/>
+          </a:effectRef>
+          <a:fontRef idx="minor">
+            <a:schemeClr val="dk1"/>
+          </a:fontRef>
+        </p:style>
+        <p:txBody>
+          <a:bodyPr wrap="none" rtlCol="0">
+            <a:noAutofit/>
+          </a:bodyPr>
+          <a:lstStyle/>
+          <a:p>
+            <a:pPr algn="ctr"/>
+            <a:r>
+              <a:rPr lang="en-US" sz="1600" dirty="0" smtClean="0">
+                <a:ln w="0"/>
+                <a:effectLst>
+                  <a:outerShdw blurRad="38100" dist="19050" dir="2700000" algn="tl" rotWithShape="0">
+                    <a:schemeClr val="dk1">
+                      <a:alpha val="40000"/>
+                    </a:schemeClr>
+                  </a:outerShdw>
+                </a:effectLst>
+              </a:rPr>
+              <a:t>4</a:t>
+            </a:r>
+          </a:p>
+        </p:txBody>
+      </p:sp>
+      <p:sp>
+        <p:nvSpPr>
+          <p:cNvPr id="20" name="Rectangle 19"/>
+          <p:cNvSpPr/>
+          <p:nvPr/>
+        </p:nvSpPr>
+        <p:spPr bwMode="auto">
+          <a:xfrm>
+            <a:off x="7882044" y="4623265"/>
+            <a:ext cx="932121" cy="510363"/>
+          </a:xfrm>
+          <a:prstGeom prst="rect">
+            <a:avLst/>
+          </a:prstGeom>
+          <a:ln>
+            <a:headEnd/>
+            <a:tailEnd/>
+          </a:ln>
+        </p:spPr>
+        <p:style>
+          <a:lnRef idx="2">
+            <a:schemeClr val="dk1"/>
+          </a:lnRef>
+          <a:fillRef idx="1">
+            <a:schemeClr val="lt1"/>
+          </a:fillRef>
+          <a:effectRef idx="0">
+            <a:schemeClr val="dk1"/>
+          </a:effectRef>
+          <a:fontRef idx="minor">
+            <a:schemeClr val="dk1"/>
+          </a:fontRef>
+        </p:style>
+        <p:txBody>
+          <a:bodyPr wrap="none" rtlCol="0" anchor="ctr"/>
+          <a:lstStyle/>
+          <a:p>
+            <a:pPr algn="ctr"/>
+            <a:endParaRPr lang="en-US" sz="1600" dirty="0" smtClean="0">
+              <a:ln w="0"/>
+              <a:effectLst>
+                <a:outerShdw blurRad="38100" dist="19050" dir="2700000" algn="tl" rotWithShape="0">
+                  <a:schemeClr val="dk1">
+                    <a:alpha val="40000"/>
+                  </a:schemeClr>
+                </a:outerShdw>
+              </a:effectLst>
+              <a:latin typeface="+mn-lt"/>
+            </a:endParaRPr>
+          </a:p>
+        </p:txBody>
+      </p:sp>
+      <p:sp>
+        <p:nvSpPr>
+          <p:cNvPr id="21" name="Rectangle 20"/>
+          <p:cNvSpPr/>
+          <p:nvPr/>
+        </p:nvSpPr>
+        <p:spPr bwMode="auto">
+          <a:xfrm>
+            <a:off x="6074513" y="4623265"/>
+            <a:ext cx="932121" cy="510363"/>
+          </a:xfrm>
+          <a:prstGeom prst="rect">
+            <a:avLst/>
+          </a:prstGeom>
+          <a:ln>
+            <a:headEnd/>
+            <a:tailEnd/>
+          </a:ln>
+        </p:spPr>
+        <p:style>
+          <a:lnRef idx="2">
+            <a:schemeClr val="dk1"/>
+          </a:lnRef>
+          <a:fillRef idx="1">
+            <a:schemeClr val="lt1"/>
+          </a:fillRef>
+          <a:effectRef idx="0">
+            <a:schemeClr val="dk1"/>
+          </a:effectRef>
+          <a:fontRef idx="minor">
+            <a:schemeClr val="dk1"/>
+          </a:fontRef>
+        </p:style>
+        <p:txBody>
+          <a:bodyPr wrap="none" rtlCol="0" anchor="ctr"/>
+          <a:lstStyle/>
+          <a:p>
+            <a:pPr algn="ctr"/>
+            <a:endParaRPr lang="en-US" sz="1600" dirty="0" smtClean="0">
+              <a:ln w="0"/>
+              <a:effectLst>
+                <a:outerShdw blurRad="38100" dist="19050" dir="2700000" algn="tl" rotWithShape="0">
+                  <a:schemeClr val="dk1">
+                    <a:alpha val="40000"/>
+                  </a:schemeClr>
+                </a:outerShdw>
+              </a:effectLst>
+              <a:latin typeface="+mn-lt"/>
+            </a:endParaRPr>
+          </a:p>
+        </p:txBody>
+      </p:sp>
+      <p:sp>
+        <p:nvSpPr>
+          <p:cNvPr id="22" name="Rectangle 21"/>
+          <p:cNvSpPr/>
+          <p:nvPr/>
+        </p:nvSpPr>
+        <p:spPr bwMode="auto">
+          <a:xfrm>
+            <a:off x="4227218" y="4623265"/>
+            <a:ext cx="932121" cy="510363"/>
+          </a:xfrm>
+          <a:prstGeom prst="rect">
+            <a:avLst/>
+          </a:prstGeom>
+          <a:ln>
+            <a:headEnd/>
+            <a:tailEnd/>
+          </a:ln>
+        </p:spPr>
+        <p:style>
+          <a:lnRef idx="2">
+            <a:schemeClr val="dk1"/>
+          </a:lnRef>
+          <a:fillRef idx="1">
+            <a:schemeClr val="lt1"/>
+          </a:fillRef>
+          <a:effectRef idx="0">
+            <a:schemeClr val="dk1"/>
+          </a:effectRef>
+          <a:fontRef idx="minor">
+            <a:schemeClr val="dk1"/>
+          </a:fontRef>
+        </p:style>
+        <p:txBody>
+          <a:bodyPr wrap="none" rtlCol="0" anchor="ctr"/>
+          <a:lstStyle/>
+          <a:p>
+            <a:pPr algn="ctr"/>
+            <a:endParaRPr lang="en-US" sz="1600" dirty="0" smtClean="0">
+              <a:ln w="0"/>
+              <a:effectLst>
+                <a:outerShdw blurRad="38100" dist="19050" dir="2700000" algn="tl" rotWithShape="0">
+                  <a:schemeClr val="dk1">
+                    <a:alpha val="40000"/>
+                  </a:schemeClr>
+                </a:outerShdw>
+              </a:effectLst>
+              <a:latin typeface="+mn-lt"/>
+            </a:endParaRPr>
+          </a:p>
+        </p:txBody>
+      </p:sp>
+      <p:sp>
+        <p:nvSpPr>
+          <p:cNvPr id="23" name="Rectangle 22"/>
+          <p:cNvSpPr/>
+          <p:nvPr/>
+        </p:nvSpPr>
+        <p:spPr bwMode="auto">
+          <a:xfrm>
+            <a:off x="2360538" y="4623265"/>
+            <a:ext cx="932121" cy="510363"/>
+          </a:xfrm>
+          <a:prstGeom prst="rect">
+            <a:avLst/>
+          </a:prstGeom>
+          <a:ln>
+            <a:headEnd/>
+            <a:tailEnd/>
+          </a:ln>
+        </p:spPr>
+        <p:style>
+          <a:lnRef idx="2">
+            <a:schemeClr val="dk1"/>
+          </a:lnRef>
+          <a:fillRef idx="1">
+            <a:schemeClr val="lt1"/>
+          </a:fillRef>
+          <a:effectRef idx="0">
+            <a:schemeClr val="dk1"/>
+          </a:effectRef>
+          <a:fontRef idx="minor">
+            <a:schemeClr val="dk1"/>
+          </a:fontRef>
+        </p:style>
+        <p:txBody>
+          <a:bodyPr wrap="none" rtlCol="0" anchor="ctr"/>
+          <a:lstStyle/>
+          <a:p>
+            <a:pPr algn="ctr"/>
+            <a:endParaRPr lang="en-US" sz="1600" dirty="0" smtClean="0">
+              <a:ln w="0"/>
+              <a:effectLst>
+                <a:outerShdw blurRad="38100" dist="19050" dir="2700000" algn="tl" rotWithShape="0">
+                  <a:schemeClr val="dk1">
+                    <a:alpha val="40000"/>
+                  </a:schemeClr>
+                </a:outerShdw>
+              </a:effectLst>
+              <a:latin typeface="+mn-lt"/>
+            </a:endParaRPr>
+          </a:p>
+        </p:txBody>
+      </p:sp>
+      <p:sp>
+        <p:nvSpPr>
+          <p:cNvPr id="24" name="TextBox 23"/>
+          <p:cNvSpPr txBox="1"/>
+          <p:nvPr/>
+        </p:nvSpPr>
+        <p:spPr>
+          <a:xfrm>
+            <a:off x="2620152" y="4690766"/>
+            <a:ext cx="409575" cy="342900"/>
+          </a:xfrm>
+          <a:prstGeom prst="rect">
+            <a:avLst/>
+          </a:prstGeom>
+          <a:ln>
+            <a:noFill/>
+          </a:ln>
+        </p:spPr>
+        <p:style>
+          <a:lnRef idx="2">
+            <a:schemeClr val="dk1"/>
+          </a:lnRef>
+          <a:fillRef idx="1">
+            <a:schemeClr val="lt1"/>
+          </a:fillRef>
+          <a:effectRef idx="0">
+            <a:schemeClr val="dk1"/>
+          </a:effectRef>
+          <a:fontRef idx="minor">
+            <a:schemeClr val="dk1"/>
+          </a:fontRef>
+        </p:style>
+        <p:txBody>
+          <a:bodyPr wrap="none" rtlCol="0">
+            <a:noAutofit/>
+          </a:bodyPr>
+          <a:lstStyle/>
+          <a:p>
+            <a:pPr algn="ctr"/>
+            <a:r>
+              <a:rPr lang="en-US" sz="1600" dirty="0" smtClean="0">
+                <a:ln w="0"/>
+                <a:effectLst>
+                  <a:outerShdw blurRad="38100" dist="19050" dir="2700000" algn="tl" rotWithShape="0">
+                    <a:schemeClr val="dk1">
+                      <a:alpha val="40000"/>
+                    </a:schemeClr>
+                  </a:outerShdw>
+                </a:effectLst>
+              </a:rPr>
+              <a:t>BG</a:t>
+            </a:r>
+          </a:p>
+        </p:txBody>
+      </p:sp>
+      <p:sp>
+        <p:nvSpPr>
+          <p:cNvPr id="25" name="TextBox 24"/>
+          <p:cNvSpPr txBox="1"/>
+          <p:nvPr/>
+        </p:nvSpPr>
+        <p:spPr>
+          <a:xfrm>
+            <a:off x="4506045" y="4690766"/>
+            <a:ext cx="409575" cy="342900"/>
+          </a:xfrm>
+          <a:prstGeom prst="rect">
+            <a:avLst/>
+          </a:prstGeom>
+          <a:ln>
+            <a:noFill/>
+          </a:ln>
+        </p:spPr>
+        <p:style>
+          <a:lnRef idx="2">
+            <a:schemeClr val="dk1"/>
+          </a:lnRef>
+          <a:fillRef idx="1">
+            <a:schemeClr val="lt1"/>
+          </a:fillRef>
+          <a:effectRef idx="0">
+            <a:schemeClr val="dk1"/>
+          </a:effectRef>
+          <a:fontRef idx="minor">
+            <a:schemeClr val="dk1"/>
+          </a:fontRef>
+        </p:style>
+        <p:txBody>
+          <a:bodyPr wrap="none" rtlCol="0">
+            <a:noAutofit/>
+          </a:bodyPr>
+          <a:lstStyle/>
+          <a:p>
+            <a:pPr algn="ctr"/>
+            <a:r>
+              <a:rPr lang="en-US" sz="1600" dirty="0" smtClean="0">
+                <a:ln w="0"/>
+                <a:effectLst>
+                  <a:outerShdw blurRad="38100" dist="19050" dir="2700000" algn="tl" rotWithShape="0">
+                    <a:schemeClr val="dk1">
+                      <a:alpha val="40000"/>
+                    </a:schemeClr>
+                  </a:outerShdw>
+                </a:effectLst>
+              </a:rPr>
+              <a:t>BG</a:t>
+            </a:r>
+          </a:p>
+        </p:txBody>
+      </p:sp>
+      <p:sp>
+        <p:nvSpPr>
+          <p:cNvPr id="26" name="TextBox 25"/>
+          <p:cNvSpPr txBox="1"/>
+          <p:nvPr/>
+        </p:nvSpPr>
+        <p:spPr>
+          <a:xfrm>
+            <a:off x="6334014" y="4690766"/>
+            <a:ext cx="409575" cy="342900"/>
+          </a:xfrm>
+          <a:prstGeom prst="rect">
+            <a:avLst/>
+          </a:prstGeom>
+          <a:ln>
+            <a:noFill/>
+          </a:ln>
+        </p:spPr>
+        <p:style>
+          <a:lnRef idx="2">
+            <a:schemeClr val="dk1"/>
+          </a:lnRef>
+          <a:fillRef idx="1">
+            <a:schemeClr val="lt1"/>
+          </a:fillRef>
+          <a:effectRef idx="0">
+            <a:schemeClr val="dk1"/>
+          </a:effectRef>
+          <a:fontRef idx="minor">
+            <a:schemeClr val="dk1"/>
+          </a:fontRef>
+        </p:style>
+        <p:txBody>
+          <a:bodyPr wrap="none" rtlCol="0">
+            <a:noAutofit/>
+          </a:bodyPr>
+          <a:lstStyle/>
+          <a:p>
+            <a:pPr algn="ctr"/>
+            <a:r>
+              <a:rPr lang="en-US" sz="1600" dirty="0" smtClean="0">
+                <a:ln w="0"/>
+                <a:effectLst>
+                  <a:outerShdw blurRad="38100" dist="19050" dir="2700000" algn="tl" rotWithShape="0">
+                    <a:schemeClr val="dk1">
+                      <a:alpha val="40000"/>
+                    </a:schemeClr>
+                  </a:outerShdw>
+                </a:effectLst>
+              </a:rPr>
+              <a:t>BG</a:t>
+            </a:r>
+          </a:p>
+        </p:txBody>
+      </p:sp>
+      <p:sp>
+        <p:nvSpPr>
+          <p:cNvPr id="27" name="TextBox 26"/>
+          <p:cNvSpPr txBox="1"/>
+          <p:nvPr/>
+        </p:nvSpPr>
+        <p:spPr>
+          <a:xfrm>
+            <a:off x="8152843" y="4690766"/>
+            <a:ext cx="409575" cy="342900"/>
+          </a:xfrm>
+          <a:prstGeom prst="rect">
+            <a:avLst/>
+          </a:prstGeom>
+          <a:ln>
+            <a:noFill/>
+          </a:ln>
+        </p:spPr>
+        <p:style>
+          <a:lnRef idx="2">
+            <a:schemeClr val="dk1"/>
+          </a:lnRef>
+          <a:fillRef idx="1">
+            <a:schemeClr val="lt1"/>
+          </a:fillRef>
+          <a:effectRef idx="0">
+            <a:schemeClr val="dk1"/>
+          </a:effectRef>
+          <a:fontRef idx="minor">
+            <a:schemeClr val="dk1"/>
+          </a:fontRef>
+        </p:style>
+        <p:txBody>
+          <a:bodyPr wrap="none" rtlCol="0">
+            <a:noAutofit/>
+          </a:bodyPr>
+          <a:lstStyle/>
+          <a:p>
+            <a:pPr algn="ctr"/>
+            <a:r>
+              <a:rPr lang="en-US" sz="1600" dirty="0" smtClean="0">
+                <a:ln w="0"/>
+                <a:effectLst>
+                  <a:outerShdw blurRad="38100" dist="19050" dir="2700000" algn="tl" rotWithShape="0">
+                    <a:schemeClr val="dk1">
+                      <a:alpha val="40000"/>
+                    </a:schemeClr>
+                  </a:outerShdw>
+                </a:effectLst>
+              </a:rPr>
+              <a:t>BG</a:t>
+            </a:r>
+          </a:p>
+        </p:txBody>
+      </p:sp>
+      <p:sp>
+        <p:nvSpPr>
+          <p:cNvPr id="32" name="Rectangle 31"/>
+          <p:cNvSpPr/>
+          <p:nvPr/>
+        </p:nvSpPr>
+        <p:spPr bwMode="auto">
+          <a:xfrm>
+            <a:off x="6353243" y="1612358"/>
+            <a:ext cx="932121" cy="510363"/>
+          </a:xfrm>
+          <a:prstGeom prst="rect">
+            <a:avLst/>
+          </a:prstGeom>
+          <a:pattFill prst="wdUpDiag">
+            <a:fgClr>
+              <a:schemeClr val="tx1"/>
+            </a:fgClr>
+            <a:bgClr>
+              <a:schemeClr val="bg1"/>
+            </a:bgClr>
+          </a:pattFill>
+          <a:ln>
+            <a:headEnd/>
+            <a:tailEnd/>
+          </a:ln>
+        </p:spPr>
+        <p:style>
+          <a:lnRef idx="2">
+            <a:schemeClr val="dk1"/>
+          </a:lnRef>
+          <a:fillRef idx="1">
+            <a:schemeClr val="lt1"/>
+          </a:fillRef>
+          <a:effectRef idx="0">
+            <a:schemeClr val="dk1"/>
+          </a:effectRef>
+          <a:fontRef idx="minor">
+            <a:schemeClr val="dk1"/>
+          </a:fontRef>
+        </p:style>
+        <p:txBody>
+          <a:bodyPr wrap="none" rtlCol="0" anchor="ctr"/>
+          <a:lstStyle/>
+          <a:p>
+            <a:pPr algn="ctr"/>
+            <a:endParaRPr lang="en-US" sz="1600" dirty="0" smtClean="0">
+              <a:ln w="0"/>
+              <a:effectLst>
+                <a:outerShdw blurRad="38100" dist="19050" dir="2700000" algn="tl" rotWithShape="0">
+                  <a:schemeClr val="dk1">
+                    <a:alpha val="40000"/>
+                  </a:schemeClr>
+                </a:outerShdw>
+              </a:effectLst>
+              <a:latin typeface="+mn-lt"/>
+            </a:endParaRPr>
+          </a:p>
+        </p:txBody>
+      </p:sp>
+      <p:sp>
+        <p:nvSpPr>
+          <p:cNvPr id="33" name="Rectangle 32"/>
+          <p:cNvSpPr/>
+          <p:nvPr/>
+        </p:nvSpPr>
+        <p:spPr bwMode="auto">
+          <a:xfrm>
+            <a:off x="6353132" y="2192705"/>
+            <a:ext cx="932121" cy="510363"/>
+          </a:xfrm>
+          <a:prstGeom prst="rect">
+            <a:avLst/>
+          </a:prstGeom>
+          <a:ln>
+            <a:headEnd/>
+            <a:tailEnd/>
+          </a:ln>
+        </p:spPr>
+        <p:style>
+          <a:lnRef idx="2">
+            <a:schemeClr val="dk1"/>
+          </a:lnRef>
+          <a:fillRef idx="1">
+            <a:schemeClr val="lt1"/>
+          </a:fillRef>
+          <a:effectRef idx="0">
+            <a:schemeClr val="dk1"/>
+          </a:effectRef>
+          <a:fontRef idx="minor">
+            <a:schemeClr val="dk1"/>
+          </a:fontRef>
+        </p:style>
+        <p:txBody>
+          <a:bodyPr wrap="none" rtlCol="0" anchor="ctr"/>
+          <a:lstStyle/>
+          <a:p>
+            <a:pPr algn="ctr"/>
+            <a:endParaRPr lang="en-US" sz="1600" dirty="0" smtClean="0">
+              <a:ln w="0"/>
+              <a:effectLst>
+                <a:outerShdw blurRad="38100" dist="19050" dir="2700000" algn="tl" rotWithShape="0">
+                  <a:schemeClr val="dk1">
+                    <a:alpha val="40000"/>
+                  </a:schemeClr>
+                </a:outerShdw>
+              </a:effectLst>
+              <a:latin typeface="+mn-lt"/>
+            </a:endParaRPr>
+          </a:p>
+        </p:txBody>
+      </p:sp>
+      <p:sp>
+        <p:nvSpPr>
+          <p:cNvPr id="34" name="TextBox 33"/>
+          <p:cNvSpPr txBox="1"/>
+          <p:nvPr/>
+        </p:nvSpPr>
+        <p:spPr>
+          <a:xfrm>
+            <a:off x="7420340" y="1675858"/>
+            <a:ext cx="2015760" cy="414879"/>
+          </a:xfrm>
+          <a:prstGeom prst="rect">
+            <a:avLst/>
+          </a:prstGeom>
+        </p:spPr>
+        <p:style>
+          <a:lnRef idx="2">
+            <a:schemeClr val="dk1"/>
+          </a:lnRef>
+          <a:fillRef idx="1">
+            <a:schemeClr val="lt1"/>
+          </a:fillRef>
+          <a:effectRef idx="0">
+            <a:schemeClr val="dk1"/>
+          </a:effectRef>
+          <a:fontRef idx="minor">
+            <a:schemeClr val="dk1"/>
+          </a:fontRef>
+        </p:style>
+        <p:txBody>
+          <a:bodyPr wrap="none" rtlCol="0">
+            <a:noAutofit/>
+          </a:bodyPr>
+          <a:lstStyle/>
+          <a:p>
+            <a:r>
+              <a:rPr lang="en-US" sz="1600" dirty="0" smtClean="0">
+                <a:ln w="0"/>
+                <a:effectLst>
+                  <a:outerShdw blurRad="38100" dist="19050" dir="2700000" algn="tl" rotWithShape="0">
+                    <a:schemeClr val="dk1">
+                      <a:alpha val="40000"/>
+                    </a:schemeClr>
+                  </a:outerShdw>
+                </a:effectLst>
+              </a:rPr>
+              <a:t>Activity block (AB)</a:t>
+            </a:r>
+          </a:p>
+          <a:p>
+            <a:pPr algn="ctr"/>
+            <a:endParaRPr lang="en-US" sz="1600" dirty="0" smtClean="0">
+              <a:ln w="0"/>
+              <a:effectLst>
+                <a:outerShdw blurRad="38100" dist="19050" dir="2700000" algn="tl" rotWithShape="0">
+                  <a:schemeClr val="dk1">
+                    <a:alpha val="40000"/>
+                  </a:schemeClr>
+                </a:outerShdw>
+              </a:effectLst>
+            </a:endParaRPr>
+          </a:p>
+        </p:txBody>
+      </p:sp>
+      <p:sp>
+        <p:nvSpPr>
+          <p:cNvPr id="35" name="TextBox 34"/>
+          <p:cNvSpPr txBox="1"/>
+          <p:nvPr/>
+        </p:nvSpPr>
+        <p:spPr>
+          <a:xfrm>
+            <a:off x="7420340" y="2281088"/>
+            <a:ext cx="2015760" cy="364364"/>
+          </a:xfrm>
+          <a:prstGeom prst="rect">
+            <a:avLst/>
+          </a:prstGeom>
+        </p:spPr>
+        <p:style>
+          <a:lnRef idx="2">
+            <a:schemeClr val="dk1"/>
+          </a:lnRef>
+          <a:fillRef idx="1">
+            <a:schemeClr val="lt1"/>
+          </a:fillRef>
+          <a:effectRef idx="0">
+            <a:schemeClr val="dk1"/>
+          </a:effectRef>
+          <a:fontRef idx="minor">
+            <a:schemeClr val="dk1"/>
+          </a:fontRef>
+        </p:style>
+        <p:txBody>
+          <a:bodyPr wrap="none" rtlCol="0">
+            <a:noAutofit/>
+          </a:bodyPr>
+          <a:lstStyle/>
+          <a:p>
+            <a:r>
+              <a:rPr lang="en-US" sz="1600" dirty="0">
+                <a:ln w="0"/>
+                <a:effectLst>
+                  <a:outerShdw blurRad="38100" dist="19050" dir="2700000" algn="tl" rotWithShape="0">
+                    <a:schemeClr val="dk1">
+                      <a:alpha val="40000"/>
+                    </a:schemeClr>
+                  </a:outerShdw>
+                </a:effectLst>
+              </a:rPr>
+              <a:t>Background </a:t>
+            </a:r>
+            <a:r>
+              <a:rPr lang="en-US" sz="1600" dirty="0" smtClean="0">
+                <a:ln w="0"/>
+                <a:effectLst>
+                  <a:outerShdw blurRad="38100" dist="19050" dir="2700000" algn="tl" rotWithShape="0">
+                    <a:schemeClr val="dk1">
+                      <a:alpha val="40000"/>
+                    </a:schemeClr>
+                  </a:outerShdw>
+                </a:effectLst>
+              </a:rPr>
+              <a:t>block (BG)</a:t>
+            </a:r>
+            <a:endParaRPr lang="en-US" sz="1600" dirty="0">
+              <a:ln w="0"/>
+              <a:effectLst>
+                <a:outerShdw blurRad="38100" dist="19050" dir="2700000" algn="tl" rotWithShape="0">
+                  <a:schemeClr val="dk1">
+                    <a:alpha val="40000"/>
+                  </a:schemeClr>
+                </a:outerShdw>
+              </a:effectLst>
+            </a:endParaRPr>
+          </a:p>
+          <a:p>
+            <a:pPr algn="ctr"/>
+            <a:endParaRPr lang="en-US" sz="1600" dirty="0" err="1" smtClean="0">
+              <a:ln w="0"/>
+              <a:effectLst>
+                <a:outerShdw blurRad="38100" dist="19050" dir="2700000" algn="tl" rotWithShape="0">
+                  <a:schemeClr val="dk1">
+                    <a:alpha val="40000"/>
+                  </a:schemeClr>
+                </a:outerShdw>
+              </a:effectLst>
+            </a:endParaRPr>
+          </a:p>
+        </p:txBody>
+      </p:sp>
+    </p:spTree>
+    <p:extLst>
+      <p:ext uri="{BB962C8B-B14F-4D97-AF65-F5344CB8AC3E}">
+        <p14:creationId xmlns:p14="http://schemas.microsoft.com/office/powerpoint/2010/main" val="2021139539"/>
+      </p:ext>
+    </p:extLst>
+  </p:cSld>
+  <p:clrMapOvr>
+    <a:masterClrMapping/>
+  </p:clrMapOvr>
+  <p:timing>
+    <p:tnLst>
+      <p:par>
+        <p:cTn id="1" dur="indefinite" restart="never" nodeType="tmRoot"/>
+      </p:par>
+    </p:tnLst>
+  </p:timing>
+</p:sld>
+</file>
+
+<file path=ppt/slides/slide2.xml><?xml version="1.0" encoding="utf-8"?>
+<p:sld xmlns:a="http://schemas.openxmlformats.org/drawingml/2006/main" xmlns:r="http://schemas.openxmlformats.org/officeDocument/2006/relationships" xmlns:p="http://schemas.openxmlformats.org/presentationml/2006/main">
+  <p:cSld>
+    <p:spTree>
+      <p:nvGrpSpPr>
+        <p:cNvPr id="1" name=""/>
+        <p:cNvGrpSpPr/>
+        <p:nvPr/>
+      </p:nvGrpSpPr>
+      <p:grpSpPr>
+        <a:xfrm>
+          <a:off x="0" y="0"/>
+          <a:ext cx="0" cy="0"/>
+          <a:chOff x="0" y="0"/>
+          <a:chExt cx="0" cy="0"/>
+        </a:xfrm>
+      </p:grpSpPr>
+      <p:sp>
+        <p:nvSpPr>
           <p:cNvPr id="4" name="Footer Placeholder 3"/>
           <p:cNvSpPr>
             <a:spLocks noGrp="1"/>
@@ -3934,7 +6525,7 @@
             <a:fld id="{963B0023-0CED-47F7-85AE-654F0B232C29}" type="slidenum">
               <a:rPr lang="en-US" smtClean="0"/>
               <a:pPr/>
-              <a:t>1</a:t>
+              <a:t>2</a:t>
             </a:fld>
             <a:endParaRPr lang="en-US" dirty="0"/>
           </a:p>
@@ -4711,7 +7302,7 @@
 </p:sld>
 </file>
 
-<file path=ppt/slides/slide2.xml><?xml version="1.0" encoding="utf-8"?>
+<file path=ppt/slides/slide3.xml><?xml version="1.0" encoding="utf-8"?>
 <p:sld xmlns:a="http://schemas.openxmlformats.org/drawingml/2006/main" xmlns:r="http://schemas.openxmlformats.org/officeDocument/2006/relationships" xmlns:p="http://schemas.openxmlformats.org/presentationml/2006/main">
   <p:cSld>
     <p:spTree>
@@ -4765,7 +7356,7 @@
             <a:fld id="{963B0023-0CED-47F7-85AE-654F0B232C29}" type="slidenum">
               <a:rPr lang="en-US" smtClean="0"/>
               <a:pPr/>
-              <a:t>2</a:t>
+              <a:t>3</a:t>
             </a:fld>
             <a:endParaRPr lang="en-US" dirty="0"/>
           </a:p>
@@ -5753,7 +8344,7 @@
 </p:sld>
 </file>
 
-<file path=ppt/slides/slide3.xml><?xml version="1.0" encoding="utf-8"?>
+<file path=ppt/slides/slide4.xml><?xml version="1.0" encoding="utf-8"?>
 <p:sld xmlns:a="http://schemas.openxmlformats.org/drawingml/2006/main" xmlns:r="http://schemas.openxmlformats.org/officeDocument/2006/relationships" xmlns:p="http://schemas.openxmlformats.org/presentationml/2006/main">
   <p:cSld>
     <p:spTree>
@@ -5812,7 +8403,7 @@
             <a:fld id="{963B0023-0CED-47F7-85AE-654F0B232C29}" type="slidenum">
               <a:rPr lang="en-US" smtClean="0"/>
               <a:pPr/>
-              <a:t>3</a:t>
+              <a:t>4</a:t>
             </a:fld>
             <a:endParaRPr lang="en-US" dirty="0"/>
           </a:p>
@@ -5901,7 +8492,7 @@
           <p:cNvPr id="8" name="Picture 7" descr="A group of people on a train track with trees in the background&#10;&#10;Description generated with high confidence">
             <a:extLst>
               <a:ext uri="{FF2B5EF4-FFF2-40B4-BE49-F238E27FC236}">
-                <a16:creationId xmlns:a16="http://schemas.microsoft.com/office/drawing/2014/main" xmlns="" id="{709FBF3E-57C3-4DBF-BD6F-A6CAE26E64AF}"/>
+                <a16:creationId xmlns="" xmlns:a16="http://schemas.microsoft.com/office/drawing/2014/main" id="{709FBF3E-57C3-4DBF-BD6F-A6CAE26E64AF}"/>
               </a:ext>
             </a:extLst>
           </p:cNvPr>
@@ -6361,7 +8952,7 @@
             <p:cNvPr id="30" name="Picture 29" descr="A group of people on a train track with trees in the background&#10;&#10;Description generated with high confidence">
               <a:extLst>
                 <a:ext uri="{FF2B5EF4-FFF2-40B4-BE49-F238E27FC236}">
-                  <a16:creationId xmlns:a16="http://schemas.microsoft.com/office/drawing/2014/main" xmlns="" id="{709FBF3E-57C3-4DBF-BD6F-A6CAE26E64AF}"/>
+                  <a16:creationId xmlns="" xmlns:a16="http://schemas.microsoft.com/office/drawing/2014/main" id="{709FBF3E-57C3-4DBF-BD6F-A6CAE26E64AF}"/>
                 </a:ext>
               </a:extLst>
             </p:cNvPr>
@@ -6747,7 +9338,7 @@
               <p:cNvPr id="34" name="Picture 33" descr="A group of people on a train track with trees in the background&#10;&#10;Description generated with high confidence">
                 <a:extLst>
                   <a:ext uri="{FF2B5EF4-FFF2-40B4-BE49-F238E27FC236}">
-                    <a16:creationId xmlns:a16="http://schemas.microsoft.com/office/drawing/2014/main" xmlns="" id="{709FBF3E-57C3-4DBF-BD6F-A6CAE26E64AF}"/>
+                    <a16:creationId xmlns="" xmlns:a16="http://schemas.microsoft.com/office/drawing/2014/main" id="{709FBF3E-57C3-4DBF-BD6F-A6CAE26E64AF}"/>
                   </a:ext>
                 </a:extLst>
               </p:cNvPr>
@@ -7183,7 +9774,7 @@
             <p:cNvPr id="55" name="Picture 54" descr="A group of people on a train track with trees in the background&#10;&#10;Description generated with high confidence">
               <a:extLst>
                 <a:ext uri="{FF2B5EF4-FFF2-40B4-BE49-F238E27FC236}">
-                  <a16:creationId xmlns:a16="http://schemas.microsoft.com/office/drawing/2014/main" xmlns="" id="{709FBF3E-57C3-4DBF-BD6F-A6CAE26E64AF}"/>
+                  <a16:creationId xmlns="" xmlns:a16="http://schemas.microsoft.com/office/drawing/2014/main" id="{709FBF3E-57C3-4DBF-BD6F-A6CAE26E64AF}"/>
                 </a:ext>
               </a:extLst>
             </p:cNvPr>
@@ -7352,7 +9943,7 @@
 </p:sld>
 </file>
 
-<file path=ppt/slides/slide4.xml><?xml version="1.0" encoding="utf-8"?>
+<file path=ppt/slides/slide5.xml><?xml version="1.0" encoding="utf-8"?>
 <p:sld xmlns:a="http://schemas.openxmlformats.org/drawingml/2006/main" xmlns:r="http://schemas.openxmlformats.org/officeDocument/2006/relationships" xmlns:p="http://schemas.openxmlformats.org/presentationml/2006/main">
   <p:cSld>
     <p:spTree>
@@ -7406,7 +9997,7 @@
             <a:fld id="{963B0023-0CED-47F7-85AE-654F0B232C29}" type="slidenum">
               <a:rPr lang="en-US" smtClean="0"/>
               <a:pPr/>
-              <a:t>4</a:t>
+              <a:t>5</a:t>
             </a:fld>
             <a:endParaRPr lang="en-US" dirty="0"/>
           </a:p>
@@ -8222,28 +10813,28 @@
                 <a:gridCol w="831029">
                   <a:extLst>
                     <a:ext uri="{9D8B030D-6E8A-4147-A177-3AD203B41FA5}">
-                      <a16:colId xmlns:a16="http://schemas.microsoft.com/office/drawing/2014/main" xmlns="" val="661884811"/>
+                      <a16:colId xmlns="" xmlns:a16="http://schemas.microsoft.com/office/drawing/2014/main" val="661884811"/>
                     </a:ext>
                   </a:extLst>
                 </a:gridCol>
                 <a:gridCol w="831029">
                   <a:extLst>
                     <a:ext uri="{9D8B030D-6E8A-4147-A177-3AD203B41FA5}">
-                      <a16:colId xmlns:a16="http://schemas.microsoft.com/office/drawing/2014/main" xmlns="" val="1227113072"/>
+                      <a16:colId xmlns="" xmlns:a16="http://schemas.microsoft.com/office/drawing/2014/main" val="1227113072"/>
                     </a:ext>
                   </a:extLst>
                 </a:gridCol>
                 <a:gridCol w="831029">
                   <a:extLst>
                     <a:ext uri="{9D8B030D-6E8A-4147-A177-3AD203B41FA5}">
-                      <a16:colId xmlns:a16="http://schemas.microsoft.com/office/drawing/2014/main" xmlns="" val="3707013559"/>
+                      <a16:colId xmlns="" xmlns:a16="http://schemas.microsoft.com/office/drawing/2014/main" val="3707013559"/>
                     </a:ext>
                   </a:extLst>
                 </a:gridCol>
                 <a:gridCol w="831029">
                   <a:extLst>
                     <a:ext uri="{9D8B030D-6E8A-4147-A177-3AD203B41FA5}">
-                      <a16:colId xmlns:a16="http://schemas.microsoft.com/office/drawing/2014/main" xmlns="" val="99603296"/>
+                      <a16:colId xmlns="" xmlns:a16="http://schemas.microsoft.com/office/drawing/2014/main" val="99603296"/>
                     </a:ext>
                   </a:extLst>
                 </a:gridCol>
@@ -8483,7 +11074,7 @@
                 </a:tc>
                 <a:extLst>
                   <a:ext uri="{0D108BD9-81ED-4DB2-BD59-A6C34878D82A}">
-                    <a16:rowId xmlns:a16="http://schemas.microsoft.com/office/drawing/2014/main" xmlns="" val="1113007400"/>
+                    <a16:rowId xmlns="" xmlns:a16="http://schemas.microsoft.com/office/drawing/2014/main" val="1113007400"/>
                   </a:ext>
                 </a:extLst>
               </a:tr>
@@ -8726,7 +11317,7 @@
                 </a:tc>
                 <a:extLst>
                   <a:ext uri="{0D108BD9-81ED-4DB2-BD59-A6C34878D82A}">
-                    <a16:rowId xmlns:a16="http://schemas.microsoft.com/office/drawing/2014/main" xmlns="" val="4264905820"/>
+                    <a16:rowId xmlns="" xmlns:a16="http://schemas.microsoft.com/office/drawing/2014/main" val="4264905820"/>
                   </a:ext>
                 </a:extLst>
               </a:tr>
@@ -8969,7 +11560,7 @@
                 </a:tc>
                 <a:extLst>
                   <a:ext uri="{0D108BD9-81ED-4DB2-BD59-A6C34878D82A}">
-                    <a16:rowId xmlns:a16="http://schemas.microsoft.com/office/drawing/2014/main" xmlns="" val="3939078064"/>
+                    <a16:rowId xmlns="" xmlns:a16="http://schemas.microsoft.com/office/drawing/2014/main" val="3939078064"/>
                   </a:ext>
                 </a:extLst>
               </a:tr>
@@ -9212,7 +11803,7 @@
                 </a:tc>
                 <a:extLst>
                   <a:ext uri="{0D108BD9-81ED-4DB2-BD59-A6C34878D82A}">
-                    <a16:rowId xmlns:a16="http://schemas.microsoft.com/office/drawing/2014/main" xmlns="" val="3098635529"/>
+                    <a16:rowId xmlns="" xmlns:a16="http://schemas.microsoft.com/office/drawing/2014/main" val="3098635529"/>
                   </a:ext>
                 </a:extLst>
               </a:tr>
@@ -9964,7 +12555,7 @@
 </p:sld>
 </file>
 
-<file path=ppt/slides/slide5.xml><?xml version="1.0" encoding="utf-8"?>
+<file path=ppt/slides/slide6.xml><?xml version="1.0" encoding="utf-8"?>
 <p:sld xmlns:a="http://schemas.openxmlformats.org/drawingml/2006/main" xmlns:r="http://schemas.openxmlformats.org/officeDocument/2006/relationships" xmlns:p="http://schemas.openxmlformats.org/presentationml/2006/main">
   <p:cSld>
     <p:spTree>
@@ -10018,7 +12609,7 @@
             <a:fld id="{963B0023-0CED-47F7-85AE-654F0B232C29}" type="slidenum">
               <a:rPr lang="en-US" smtClean="0"/>
               <a:pPr/>
-              <a:t>5</a:t>
+              <a:t>6</a:t>
             </a:fld>
             <a:endParaRPr lang="en-US" dirty="0"/>
           </a:p>
@@ -10497,7 +13088,7 @@
             <p:cNvPr id="15" name="Picture 14" descr="A group of people on a train track with trees in the background&#10;&#10;Description generated with high confidence">
               <a:extLst>
                 <a:ext uri="{FF2B5EF4-FFF2-40B4-BE49-F238E27FC236}">
-                  <a16:creationId xmlns:a16="http://schemas.microsoft.com/office/drawing/2014/main" xmlns="" id="{709FBF3E-57C3-4DBF-BD6F-A6CAE26E64AF}"/>
+                  <a16:creationId xmlns="" xmlns:a16="http://schemas.microsoft.com/office/drawing/2014/main" id="{709FBF3E-57C3-4DBF-BD6F-A6CAE26E64AF}"/>
                 </a:ext>
               </a:extLst>
             </p:cNvPr>
@@ -11685,7 +14276,7 @@
 </p:sld>
 </file>
 
-<file path=ppt/slides/slide6.xml><?xml version="1.0" encoding="utf-8"?>
+<file path=ppt/slides/slide7.xml><?xml version="1.0" encoding="utf-8"?>
 <p:sld xmlns:a="http://schemas.openxmlformats.org/drawingml/2006/main" xmlns:r="http://schemas.openxmlformats.org/officeDocument/2006/relationships" xmlns:p="http://schemas.openxmlformats.org/presentationml/2006/main">
   <p:cSld>
     <p:spTree>
@@ -11759,7 +14350,7 @@
             <a:fld id="{963B0023-0CED-47F7-85AE-654F0B232C29}" type="slidenum">
               <a:rPr lang="en-US" smtClean="0"/>
               <a:pPr/>
-              <a:t>6</a:t>
+              <a:t>7</a:t>
             </a:fld>
             <a:endParaRPr lang="en-US" dirty="0"/>
           </a:p>
@@ -11770,7 +14361,7 @@
           <p:cNvPr id="6" name="Picture 5" descr="A group of people on a train track with trees in the background&#10;&#10;Description generated with high confidence">
             <a:extLst>
               <a:ext uri="{FF2B5EF4-FFF2-40B4-BE49-F238E27FC236}">
-                <a16:creationId xmlns:a16="http://schemas.microsoft.com/office/drawing/2014/main" xmlns="" id="{709FBF3E-57C3-4DBF-BD6F-A6CAE26E64AF}"/>
+                <a16:creationId xmlns="" xmlns:a16="http://schemas.microsoft.com/office/drawing/2014/main" id="{709FBF3E-57C3-4DBF-BD6F-A6CAE26E64AF}"/>
               </a:ext>
             </a:extLst>
           </p:cNvPr>
@@ -11990,7 +14581,7 @@
           <p:cNvPr id="13" name="Picture 12" descr="A group of people on a train track with trees in the background&#10;&#10;Description generated with high confidence">
             <a:extLst>
               <a:ext uri="{FF2B5EF4-FFF2-40B4-BE49-F238E27FC236}">
-                <a16:creationId xmlns:a16="http://schemas.microsoft.com/office/drawing/2014/main" xmlns="" id="{709FBF3E-57C3-4DBF-BD6F-A6CAE26E64AF}"/>
+                <a16:creationId xmlns="" xmlns:a16="http://schemas.microsoft.com/office/drawing/2014/main" id="{709FBF3E-57C3-4DBF-BD6F-A6CAE26E64AF}"/>
               </a:ext>
             </a:extLst>
           </p:cNvPr>
@@ -12392,7 +14983,7 @@
 </p:sld>
 </file>
 
-<file path=ppt/slides/slide7.xml><?xml version="1.0" encoding="utf-8"?>
+<file path=ppt/slides/slide8.xml><?xml version="1.0" encoding="utf-8"?>
 <p:sld xmlns:a="http://schemas.openxmlformats.org/drawingml/2006/main" xmlns:r="http://schemas.openxmlformats.org/officeDocument/2006/relationships" xmlns:p="http://schemas.openxmlformats.org/presentationml/2006/main">
   <p:cSld>
     <p:spTree>
@@ -12446,7 +15037,7 @@
             <a:fld id="{963B0023-0CED-47F7-85AE-654F0B232C29}" type="slidenum">
               <a:rPr lang="en-US" smtClean="0"/>
               <a:pPr/>
-              <a:t>7</a:t>
+              <a:t>8</a:t>
             </a:fld>
             <a:endParaRPr lang="en-US" dirty="0"/>
           </a:p>
@@ -12710,7 +15301,7 @@
           <p:cNvPr id="15" name="Picture 14" descr="A group of people on a train track with trees in the background&#10;&#10;Description generated with high confidence">
             <a:extLst>
               <a:ext uri="{FF2B5EF4-FFF2-40B4-BE49-F238E27FC236}">
-                <a16:creationId xmlns:a16="http://schemas.microsoft.com/office/drawing/2014/main" xmlns="" id="{709FBF3E-57C3-4DBF-BD6F-A6CAE26E64AF}"/>
+                <a16:creationId xmlns="" xmlns:a16="http://schemas.microsoft.com/office/drawing/2014/main" id="{709FBF3E-57C3-4DBF-BD6F-A6CAE26E64AF}"/>
               </a:ext>
             </a:extLst>
           </p:cNvPr>
@@ -13349,7 +15940,7 @@
 </p:sld>
 </file>
 
-<file path=ppt/slides/slide8.xml><?xml version="1.0" encoding="utf-8"?>
+<file path=ppt/slides/slide9.xml><?xml version="1.0" encoding="utf-8"?>
 <p:sld xmlns:a="http://schemas.openxmlformats.org/drawingml/2006/main" xmlns:r="http://schemas.openxmlformats.org/officeDocument/2006/relationships" xmlns:p="http://schemas.openxmlformats.org/presentationml/2006/main">
   <p:cSld>
     <p:spTree>
@@ -13423,7 +16014,7 @@
             <a:fld id="{BFEBEB0A-9E3D-4B14-9782-E2AE3DA60D96}" type="slidenum">
               <a:rPr lang="en-US" smtClean="0"/>
               <a:pPr/>
-              <a:t>8</a:t>
+              <a:t>9</a:t>
             </a:fld>
             <a:endParaRPr lang="en-US" dirty="0"/>
           </a:p>
@@ -13980,1562 +16571,6 @@
     <p:extLst>
       <p:ext uri="{BB962C8B-B14F-4D97-AF65-F5344CB8AC3E}">
         <p14:creationId xmlns:p14="http://schemas.microsoft.com/office/powerpoint/2010/main" val="3324504573"/>
-      </p:ext>
-    </p:extLst>
-  </p:cSld>
-  <p:clrMapOvr>
-    <a:masterClrMapping/>
-  </p:clrMapOvr>
-  <p:timing>
-    <p:tnLst>
-      <p:par>
-        <p:cTn id="1" dur="indefinite" restart="never" nodeType="tmRoot"/>
-      </p:par>
-    </p:tnLst>
-  </p:timing>
-</p:sld>
-</file>
-
-<file path=ppt/slides/slide9.xml><?xml version="1.0" encoding="utf-8"?>
-<p:sld xmlns:a="http://schemas.openxmlformats.org/drawingml/2006/main" xmlns:r="http://schemas.openxmlformats.org/officeDocument/2006/relationships" xmlns:p="http://schemas.openxmlformats.org/presentationml/2006/main">
-  <p:cSld>
-    <p:spTree>
-      <p:nvGrpSpPr>
-        <p:cNvPr id="1" name=""/>
-        <p:cNvGrpSpPr/>
-        <p:nvPr/>
-      </p:nvGrpSpPr>
-      <p:grpSpPr>
-        <a:xfrm>
-          <a:off x="0" y="0"/>
-          <a:ext cx="0" cy="0"/>
-          <a:chOff x="0" y="0"/>
-          <a:chExt cx="0" cy="0"/>
-        </a:xfrm>
-      </p:grpSpPr>
-      <p:sp>
-        <p:nvSpPr>
-          <p:cNvPr id="4" name="Rectangle 3"/>
-          <p:cNvSpPr/>
-          <p:nvPr/>
-        </p:nvSpPr>
-        <p:spPr bwMode="auto">
-          <a:xfrm>
-            <a:off x="2370617" y="3811698"/>
-            <a:ext cx="3426894" cy="510363"/>
-          </a:xfrm>
-          <a:prstGeom prst="rect">
-            <a:avLst/>
-          </a:prstGeom>
-          <a:pattFill prst="wdUpDiag">
-            <a:fgClr>
-              <a:schemeClr val="tx1"/>
-            </a:fgClr>
-            <a:bgClr>
-              <a:schemeClr val="bg1"/>
-            </a:bgClr>
-          </a:pattFill>
-          <a:ln>
-            <a:headEnd/>
-            <a:tailEnd/>
-          </a:ln>
-        </p:spPr>
-        <p:style>
-          <a:lnRef idx="2">
-            <a:schemeClr val="dk1"/>
-          </a:lnRef>
-          <a:fillRef idx="1">
-            <a:schemeClr val="lt1"/>
-          </a:fillRef>
-          <a:effectRef idx="0">
-            <a:schemeClr val="dk1"/>
-          </a:effectRef>
-          <a:fontRef idx="minor">
-            <a:schemeClr val="dk1"/>
-          </a:fontRef>
-        </p:style>
-        <p:txBody>
-          <a:bodyPr wrap="none" rtlCol="0" anchor="ctr"/>
-          <a:lstStyle/>
-          <a:p>
-            <a:pPr algn="ctr"/>
-            <a:endParaRPr lang="en-US" sz="1600" dirty="0">
-              <a:ln w="0"/>
-              <a:effectLst>
-                <a:outerShdw blurRad="38100" dist="19050" dir="2700000" algn="tl" rotWithShape="0">
-                  <a:schemeClr val="dk1">
-                    <a:alpha val="40000"/>
-                  </a:schemeClr>
-                </a:outerShdw>
-              </a:effectLst>
-            </a:endParaRPr>
-          </a:p>
-        </p:txBody>
-      </p:sp>
-      <p:cxnSp>
-        <p:nvCxnSpPr>
-          <p:cNvPr id="5" name="Straight Connector 4"/>
-          <p:cNvCxnSpPr/>
-          <p:nvPr/>
-        </p:nvCxnSpPr>
-        <p:spPr>
-          <a:xfrm>
-            <a:off x="3302738" y="3811698"/>
-            <a:ext cx="0" cy="510363"/>
-          </a:xfrm>
-          <a:prstGeom prst="line">
-            <a:avLst/>
-          </a:prstGeom>
-          <a:ln/>
-        </p:spPr>
-        <p:style>
-          <a:lnRef idx="2">
-            <a:schemeClr val="dk1"/>
-          </a:lnRef>
-          <a:fillRef idx="1">
-            <a:schemeClr val="lt1"/>
-          </a:fillRef>
-          <a:effectRef idx="0">
-            <a:schemeClr val="dk1"/>
-          </a:effectRef>
-          <a:fontRef idx="minor">
-            <a:schemeClr val="dk1"/>
-          </a:fontRef>
-        </p:style>
-      </p:cxnSp>
-      <p:cxnSp>
-        <p:nvCxnSpPr>
-          <p:cNvPr id="6" name="Straight Connector 5"/>
-          <p:cNvCxnSpPr/>
-          <p:nvPr/>
-        </p:nvCxnSpPr>
-        <p:spPr>
-          <a:xfrm>
-            <a:off x="4226663" y="3811698"/>
-            <a:ext cx="0" cy="510363"/>
-          </a:xfrm>
-          <a:prstGeom prst="line">
-            <a:avLst/>
-          </a:prstGeom>
-          <a:ln/>
-        </p:spPr>
-        <p:style>
-          <a:lnRef idx="2">
-            <a:schemeClr val="dk1"/>
-          </a:lnRef>
-          <a:fillRef idx="1">
-            <a:schemeClr val="lt1"/>
-          </a:fillRef>
-          <a:effectRef idx="0">
-            <a:schemeClr val="dk1"/>
-          </a:effectRef>
-          <a:fontRef idx="minor">
-            <a:schemeClr val="dk1"/>
-          </a:fontRef>
-        </p:style>
-      </p:cxnSp>
-      <p:cxnSp>
-        <p:nvCxnSpPr>
-          <p:cNvPr id="7" name="Straight Connector 6"/>
-          <p:cNvCxnSpPr/>
-          <p:nvPr/>
-        </p:nvCxnSpPr>
-        <p:spPr>
-          <a:xfrm>
-            <a:off x="5141063" y="3811698"/>
-            <a:ext cx="0" cy="510363"/>
-          </a:xfrm>
-          <a:prstGeom prst="line">
-            <a:avLst/>
-          </a:prstGeom>
-          <a:ln/>
-        </p:spPr>
-        <p:style>
-          <a:lnRef idx="2">
-            <a:schemeClr val="dk1"/>
-          </a:lnRef>
-          <a:fillRef idx="1">
-            <a:schemeClr val="lt1"/>
-          </a:fillRef>
-          <a:effectRef idx="0">
-            <a:schemeClr val="dk1"/>
-          </a:effectRef>
-          <a:fontRef idx="minor">
-            <a:schemeClr val="dk1"/>
-          </a:fontRef>
-        </p:style>
-      </p:cxnSp>
-      <p:sp>
-        <p:nvSpPr>
-          <p:cNvPr id="8" name="TextBox 7"/>
-          <p:cNvSpPr txBox="1"/>
-          <p:nvPr/>
-        </p:nvSpPr>
-        <p:spPr>
-          <a:xfrm>
-            <a:off x="2655592" y="3890666"/>
-            <a:ext cx="390525" cy="333375"/>
-          </a:xfrm>
-          <a:prstGeom prst="rect">
-            <a:avLst/>
-          </a:prstGeom>
-          <a:ln>
-            <a:noFill/>
-          </a:ln>
-        </p:spPr>
-        <p:style>
-          <a:lnRef idx="2">
-            <a:schemeClr val="dk1"/>
-          </a:lnRef>
-          <a:fillRef idx="1">
-            <a:schemeClr val="lt1"/>
-          </a:fillRef>
-          <a:effectRef idx="0">
-            <a:schemeClr val="dk1"/>
-          </a:effectRef>
-          <a:fontRef idx="minor">
-            <a:schemeClr val="dk1"/>
-          </a:fontRef>
-        </p:style>
-        <p:txBody>
-          <a:bodyPr wrap="none" rtlCol="0">
-            <a:noAutofit/>
-          </a:bodyPr>
-          <a:lstStyle/>
-          <a:p>
-            <a:pPr algn="ctr"/>
-            <a:r>
-              <a:rPr lang="en-US" sz="1600" dirty="0" smtClean="0">
-                <a:ln w="0"/>
-                <a:effectLst>
-                  <a:outerShdw blurRad="38100" dist="19050" dir="2700000" algn="tl" rotWithShape="0">
-                    <a:schemeClr val="dk1">
-                      <a:alpha val="40000"/>
-                    </a:schemeClr>
-                  </a:outerShdw>
-                </a:effectLst>
-              </a:rPr>
-              <a:t>1</a:t>
-            </a:r>
-          </a:p>
-        </p:txBody>
-      </p:sp>
-      <p:sp>
-        <p:nvSpPr>
-          <p:cNvPr id="9" name="TextBox 8"/>
-          <p:cNvSpPr txBox="1"/>
-          <p:nvPr/>
-        </p:nvSpPr>
-        <p:spPr>
-          <a:xfrm>
-            <a:off x="3587713" y="3890666"/>
-            <a:ext cx="390525" cy="333375"/>
-          </a:xfrm>
-          <a:prstGeom prst="rect">
-            <a:avLst/>
-          </a:prstGeom>
-          <a:ln>
-            <a:noFill/>
-          </a:ln>
-        </p:spPr>
-        <p:style>
-          <a:lnRef idx="2">
-            <a:schemeClr val="dk1"/>
-          </a:lnRef>
-          <a:fillRef idx="1">
-            <a:schemeClr val="lt1"/>
-          </a:fillRef>
-          <a:effectRef idx="0">
-            <a:schemeClr val="dk1"/>
-          </a:effectRef>
-          <a:fontRef idx="minor">
-            <a:schemeClr val="dk1"/>
-          </a:fontRef>
-        </p:style>
-        <p:txBody>
-          <a:bodyPr wrap="none" rtlCol="0">
-            <a:noAutofit/>
-          </a:bodyPr>
-          <a:lstStyle/>
-          <a:p>
-            <a:pPr algn="ctr"/>
-            <a:r>
-              <a:rPr lang="en-US" sz="1600" dirty="0" smtClean="0">
-                <a:ln w="0"/>
-                <a:effectLst>
-                  <a:outerShdw blurRad="38100" dist="19050" dir="2700000" algn="tl" rotWithShape="0">
-                    <a:schemeClr val="dk1">
-                      <a:alpha val="40000"/>
-                    </a:schemeClr>
-                  </a:outerShdw>
-                </a:effectLst>
-              </a:rPr>
-              <a:t>2</a:t>
-            </a:r>
-          </a:p>
-        </p:txBody>
-      </p:sp>
-      <p:sp>
-        <p:nvSpPr>
-          <p:cNvPr id="10" name="TextBox 9"/>
-          <p:cNvSpPr txBox="1"/>
-          <p:nvPr/>
-        </p:nvSpPr>
-        <p:spPr>
-          <a:xfrm>
-            <a:off x="4502112" y="3890666"/>
-            <a:ext cx="390525" cy="333375"/>
-          </a:xfrm>
-          <a:prstGeom prst="rect">
-            <a:avLst/>
-          </a:prstGeom>
-          <a:ln>
-            <a:noFill/>
-          </a:ln>
-        </p:spPr>
-        <p:style>
-          <a:lnRef idx="2">
-            <a:schemeClr val="dk1"/>
-          </a:lnRef>
-          <a:fillRef idx="1">
-            <a:schemeClr val="lt1"/>
-          </a:fillRef>
-          <a:effectRef idx="0">
-            <a:schemeClr val="dk1"/>
-          </a:effectRef>
-          <a:fontRef idx="minor">
-            <a:schemeClr val="dk1"/>
-          </a:fontRef>
-        </p:style>
-        <p:txBody>
-          <a:bodyPr wrap="none" rtlCol="0">
-            <a:noAutofit/>
-          </a:bodyPr>
-          <a:lstStyle/>
-          <a:p>
-            <a:pPr algn="ctr"/>
-            <a:r>
-              <a:rPr lang="en-US" sz="1600" dirty="0" smtClean="0">
-                <a:ln w="0"/>
-                <a:effectLst>
-                  <a:outerShdw blurRad="38100" dist="19050" dir="2700000" algn="tl" rotWithShape="0">
-                    <a:schemeClr val="dk1">
-                      <a:alpha val="40000"/>
-                    </a:schemeClr>
-                  </a:outerShdw>
-                </a:effectLst>
-              </a:rPr>
-              <a:t>3</a:t>
-            </a:r>
-          </a:p>
-        </p:txBody>
-      </p:sp>
-      <p:sp>
-        <p:nvSpPr>
-          <p:cNvPr id="11" name="TextBox 10"/>
-          <p:cNvSpPr txBox="1"/>
-          <p:nvPr/>
-        </p:nvSpPr>
-        <p:spPr>
-          <a:xfrm>
-            <a:off x="5406986" y="3890666"/>
-            <a:ext cx="390525" cy="333375"/>
-          </a:xfrm>
-          <a:prstGeom prst="rect">
-            <a:avLst/>
-          </a:prstGeom>
-          <a:ln>
-            <a:noFill/>
-          </a:ln>
-        </p:spPr>
-        <p:style>
-          <a:lnRef idx="2">
-            <a:schemeClr val="dk1"/>
-          </a:lnRef>
-          <a:fillRef idx="1">
-            <a:schemeClr val="lt1"/>
-          </a:fillRef>
-          <a:effectRef idx="0">
-            <a:schemeClr val="dk1"/>
-          </a:effectRef>
-          <a:fontRef idx="minor">
-            <a:schemeClr val="dk1"/>
-          </a:fontRef>
-        </p:style>
-        <p:txBody>
-          <a:bodyPr wrap="none" rtlCol="0">
-            <a:noAutofit/>
-          </a:bodyPr>
-          <a:lstStyle/>
-          <a:p>
-            <a:pPr algn="ctr"/>
-            <a:r>
-              <a:rPr lang="en-US" sz="1600" dirty="0" smtClean="0">
-                <a:ln w="0"/>
-                <a:effectLst>
-                  <a:outerShdw blurRad="38100" dist="19050" dir="2700000" algn="tl" rotWithShape="0">
-                    <a:schemeClr val="dk1">
-                      <a:alpha val="40000"/>
-                    </a:schemeClr>
-                  </a:outerShdw>
-                </a:effectLst>
-              </a:rPr>
-              <a:t>4</a:t>
-            </a:r>
-          </a:p>
-        </p:txBody>
-      </p:sp>
-      <p:sp>
-        <p:nvSpPr>
-          <p:cNvPr id="12" name="Rectangle 11"/>
-          <p:cNvSpPr/>
-          <p:nvPr/>
-        </p:nvSpPr>
-        <p:spPr bwMode="auto">
-          <a:xfrm>
-            <a:off x="3304067" y="4623265"/>
-            <a:ext cx="932121" cy="510363"/>
-          </a:xfrm>
-          <a:prstGeom prst="rect">
-            <a:avLst/>
-          </a:prstGeom>
-          <a:pattFill prst="wdUpDiag">
-            <a:fgClr>
-              <a:schemeClr val="tx1"/>
-            </a:fgClr>
-            <a:bgClr>
-              <a:schemeClr val="bg1"/>
-            </a:bgClr>
-          </a:pattFill>
-          <a:ln>
-            <a:headEnd/>
-            <a:tailEnd/>
-          </a:ln>
-        </p:spPr>
-        <p:style>
-          <a:lnRef idx="2">
-            <a:schemeClr val="dk1"/>
-          </a:lnRef>
-          <a:fillRef idx="1">
-            <a:schemeClr val="lt1"/>
-          </a:fillRef>
-          <a:effectRef idx="0">
-            <a:schemeClr val="dk1"/>
-          </a:effectRef>
-          <a:fontRef idx="minor">
-            <a:schemeClr val="dk1"/>
-          </a:fontRef>
-        </p:style>
-        <p:txBody>
-          <a:bodyPr wrap="none" rtlCol="0" anchor="ctr"/>
-          <a:lstStyle/>
-          <a:p>
-            <a:pPr algn="ctr"/>
-            <a:endParaRPr lang="en-US" sz="1600" dirty="0">
-              <a:ln w="0"/>
-              <a:effectLst>
-                <a:outerShdw blurRad="38100" dist="19050" dir="2700000" algn="tl" rotWithShape="0">
-                  <a:schemeClr val="dk1">
-                    <a:alpha val="40000"/>
-                  </a:schemeClr>
-                </a:outerShdw>
-              </a:effectLst>
-            </a:endParaRPr>
-          </a:p>
-        </p:txBody>
-      </p:sp>
-      <p:sp>
-        <p:nvSpPr>
-          <p:cNvPr id="13" name="Rectangle 12"/>
-          <p:cNvSpPr/>
-          <p:nvPr/>
-        </p:nvSpPr>
-        <p:spPr bwMode="auto">
-          <a:xfrm>
-            <a:off x="5130984" y="4623265"/>
-            <a:ext cx="932121" cy="510363"/>
-          </a:xfrm>
-          <a:prstGeom prst="rect">
-            <a:avLst/>
-          </a:prstGeom>
-          <a:pattFill prst="wdUpDiag">
-            <a:fgClr>
-              <a:schemeClr val="tx1"/>
-            </a:fgClr>
-            <a:bgClr>
-              <a:schemeClr val="bg1"/>
-            </a:bgClr>
-          </a:pattFill>
-          <a:ln>
-            <a:headEnd/>
-            <a:tailEnd/>
-          </a:ln>
-        </p:spPr>
-        <p:style>
-          <a:lnRef idx="2">
-            <a:schemeClr val="dk1"/>
-          </a:lnRef>
-          <a:fillRef idx="1">
-            <a:schemeClr val="lt1"/>
-          </a:fillRef>
-          <a:effectRef idx="0">
-            <a:schemeClr val="dk1"/>
-          </a:effectRef>
-          <a:fontRef idx="minor">
-            <a:schemeClr val="dk1"/>
-          </a:fontRef>
-        </p:style>
-        <p:txBody>
-          <a:bodyPr wrap="none" rtlCol="0" anchor="ctr"/>
-          <a:lstStyle/>
-          <a:p>
-            <a:pPr algn="ctr"/>
-            <a:endParaRPr lang="en-US" sz="1600" dirty="0">
-              <a:ln w="0"/>
-              <a:effectLst>
-                <a:outerShdw blurRad="38100" dist="19050" dir="2700000" algn="tl" rotWithShape="0">
-                  <a:schemeClr val="dk1">
-                    <a:alpha val="40000"/>
-                  </a:schemeClr>
-                </a:outerShdw>
-              </a:effectLst>
-            </a:endParaRPr>
-          </a:p>
-        </p:txBody>
-      </p:sp>
-      <p:sp>
-        <p:nvSpPr>
-          <p:cNvPr id="14" name="Rectangle 13"/>
-          <p:cNvSpPr/>
-          <p:nvPr/>
-        </p:nvSpPr>
-        <p:spPr bwMode="auto">
-          <a:xfrm>
-            <a:off x="6949925" y="4623265"/>
-            <a:ext cx="932121" cy="510363"/>
-          </a:xfrm>
-          <a:prstGeom prst="rect">
-            <a:avLst/>
-          </a:prstGeom>
-          <a:pattFill prst="wdUpDiag">
-            <a:fgClr>
-              <a:schemeClr val="tx1"/>
-            </a:fgClr>
-            <a:bgClr>
-              <a:schemeClr val="bg1"/>
-            </a:bgClr>
-          </a:pattFill>
-          <a:ln>
-            <a:headEnd/>
-            <a:tailEnd/>
-          </a:ln>
-        </p:spPr>
-        <p:style>
-          <a:lnRef idx="2">
-            <a:schemeClr val="dk1"/>
-          </a:lnRef>
-          <a:fillRef idx="1">
-            <a:schemeClr val="lt1"/>
-          </a:fillRef>
-          <a:effectRef idx="0">
-            <a:schemeClr val="dk1"/>
-          </a:effectRef>
-          <a:fontRef idx="minor">
-            <a:schemeClr val="dk1"/>
-          </a:fontRef>
-        </p:style>
-        <p:txBody>
-          <a:bodyPr wrap="none" rtlCol="0" anchor="ctr"/>
-          <a:lstStyle/>
-          <a:p>
-            <a:pPr algn="ctr"/>
-            <a:endParaRPr lang="en-US" sz="1600" dirty="0">
-              <a:ln w="0"/>
-              <a:effectLst>
-                <a:outerShdw blurRad="38100" dist="19050" dir="2700000" algn="tl" rotWithShape="0">
-                  <a:schemeClr val="dk1">
-                    <a:alpha val="40000"/>
-                  </a:schemeClr>
-                </a:outerShdw>
-              </a:effectLst>
-            </a:endParaRPr>
-          </a:p>
-        </p:txBody>
-      </p:sp>
-      <p:sp>
-        <p:nvSpPr>
-          <p:cNvPr id="15" name="Rectangle 14"/>
-          <p:cNvSpPr/>
-          <p:nvPr/>
-        </p:nvSpPr>
-        <p:spPr bwMode="auto">
-          <a:xfrm>
-            <a:off x="8776842" y="4623265"/>
-            <a:ext cx="643383" cy="510363"/>
-          </a:xfrm>
-          <a:prstGeom prst="rect">
-            <a:avLst/>
-          </a:prstGeom>
-          <a:pattFill prst="wdUpDiag">
-            <a:fgClr>
-              <a:schemeClr val="tx1"/>
-            </a:fgClr>
-            <a:bgClr>
-              <a:schemeClr val="bg1"/>
-            </a:bgClr>
-          </a:pattFill>
-          <a:ln>
-            <a:headEnd/>
-            <a:tailEnd/>
-          </a:ln>
-        </p:spPr>
-        <p:style>
-          <a:lnRef idx="2">
-            <a:schemeClr val="dk1"/>
-          </a:lnRef>
-          <a:fillRef idx="1">
-            <a:schemeClr val="lt1"/>
-          </a:fillRef>
-          <a:effectRef idx="0">
-            <a:schemeClr val="dk1"/>
-          </a:effectRef>
-          <a:fontRef idx="minor">
-            <a:schemeClr val="dk1"/>
-          </a:fontRef>
-        </p:style>
-        <p:txBody>
-          <a:bodyPr wrap="none" rtlCol="0" anchor="ctr"/>
-          <a:lstStyle/>
-          <a:p>
-            <a:pPr algn="ctr"/>
-            <a:endParaRPr lang="en-US" sz="1600" dirty="0">
-              <a:ln w="0"/>
-              <a:effectLst>
-                <a:outerShdw blurRad="38100" dist="19050" dir="2700000" algn="tl" rotWithShape="0">
-                  <a:schemeClr val="dk1">
-                    <a:alpha val="40000"/>
-                  </a:schemeClr>
-                </a:outerShdw>
-              </a:effectLst>
-            </a:endParaRPr>
-          </a:p>
-        </p:txBody>
-      </p:sp>
-      <p:sp>
-        <p:nvSpPr>
-          <p:cNvPr id="16" name="TextBox 15"/>
-          <p:cNvSpPr txBox="1"/>
-          <p:nvPr/>
-        </p:nvSpPr>
-        <p:spPr>
-          <a:xfrm>
-            <a:off x="3589042" y="4683185"/>
-            <a:ext cx="390525" cy="333375"/>
-          </a:xfrm>
-          <a:prstGeom prst="rect">
-            <a:avLst/>
-          </a:prstGeom>
-          <a:ln>
-            <a:noFill/>
-          </a:ln>
-        </p:spPr>
-        <p:style>
-          <a:lnRef idx="2">
-            <a:schemeClr val="dk1"/>
-          </a:lnRef>
-          <a:fillRef idx="1">
-            <a:schemeClr val="lt1"/>
-          </a:fillRef>
-          <a:effectRef idx="0">
-            <a:schemeClr val="dk1"/>
-          </a:effectRef>
-          <a:fontRef idx="minor">
-            <a:schemeClr val="dk1"/>
-          </a:fontRef>
-        </p:style>
-        <p:txBody>
-          <a:bodyPr wrap="none" rtlCol="0">
-            <a:noAutofit/>
-          </a:bodyPr>
-          <a:lstStyle/>
-          <a:p>
-            <a:pPr algn="ctr"/>
-            <a:r>
-              <a:rPr lang="en-US" sz="1600" dirty="0" smtClean="0">
-                <a:ln w="0"/>
-                <a:effectLst>
-                  <a:outerShdw blurRad="38100" dist="19050" dir="2700000" algn="tl" rotWithShape="0">
-                    <a:schemeClr val="dk1">
-                      <a:alpha val="40000"/>
-                    </a:schemeClr>
-                  </a:outerShdw>
-                </a:effectLst>
-              </a:rPr>
-              <a:t>1</a:t>
-            </a:r>
-          </a:p>
-        </p:txBody>
-      </p:sp>
-      <p:sp>
-        <p:nvSpPr>
-          <p:cNvPr id="17" name="TextBox 16"/>
-          <p:cNvSpPr txBox="1"/>
-          <p:nvPr/>
-        </p:nvSpPr>
-        <p:spPr>
-          <a:xfrm>
-            <a:off x="5433679" y="4711760"/>
-            <a:ext cx="390525" cy="333375"/>
-          </a:xfrm>
-          <a:prstGeom prst="rect">
-            <a:avLst/>
-          </a:prstGeom>
-          <a:ln>
-            <a:noFill/>
-          </a:ln>
-        </p:spPr>
-        <p:style>
-          <a:lnRef idx="2">
-            <a:schemeClr val="dk1"/>
-          </a:lnRef>
-          <a:fillRef idx="1">
-            <a:schemeClr val="lt1"/>
-          </a:fillRef>
-          <a:effectRef idx="0">
-            <a:schemeClr val="dk1"/>
-          </a:effectRef>
-          <a:fontRef idx="minor">
-            <a:schemeClr val="dk1"/>
-          </a:fontRef>
-        </p:style>
-        <p:txBody>
-          <a:bodyPr wrap="none" rtlCol="0">
-            <a:noAutofit/>
-          </a:bodyPr>
-          <a:lstStyle/>
-          <a:p>
-            <a:pPr algn="ctr"/>
-            <a:r>
-              <a:rPr lang="en-US" sz="1600" dirty="0" smtClean="0">
-                <a:ln w="0"/>
-                <a:effectLst>
-                  <a:outerShdw blurRad="38100" dist="19050" dir="2700000" algn="tl" rotWithShape="0">
-                    <a:schemeClr val="dk1">
-                      <a:alpha val="40000"/>
-                    </a:schemeClr>
-                  </a:outerShdw>
-                </a:effectLst>
-              </a:rPr>
-              <a:t>2</a:t>
-            </a:r>
-          </a:p>
-        </p:txBody>
-      </p:sp>
-      <p:sp>
-        <p:nvSpPr>
-          <p:cNvPr id="18" name="TextBox 17"/>
-          <p:cNvSpPr txBox="1"/>
-          <p:nvPr/>
-        </p:nvSpPr>
-        <p:spPr>
-          <a:xfrm>
-            <a:off x="7220722" y="4711758"/>
-            <a:ext cx="390525" cy="333375"/>
-          </a:xfrm>
-          <a:prstGeom prst="rect">
-            <a:avLst/>
-          </a:prstGeom>
-          <a:ln>
-            <a:noFill/>
-          </a:ln>
-        </p:spPr>
-        <p:style>
-          <a:lnRef idx="2">
-            <a:schemeClr val="dk1"/>
-          </a:lnRef>
-          <a:fillRef idx="1">
-            <a:schemeClr val="lt1"/>
-          </a:fillRef>
-          <a:effectRef idx="0">
-            <a:schemeClr val="dk1"/>
-          </a:effectRef>
-          <a:fontRef idx="minor">
-            <a:schemeClr val="dk1"/>
-          </a:fontRef>
-        </p:style>
-        <p:txBody>
-          <a:bodyPr wrap="none" rtlCol="0">
-            <a:noAutofit/>
-          </a:bodyPr>
-          <a:lstStyle/>
-          <a:p>
-            <a:pPr algn="ctr"/>
-            <a:r>
-              <a:rPr lang="en-US" sz="1600" dirty="0" smtClean="0">
-                <a:ln w="0"/>
-                <a:effectLst>
-                  <a:outerShdw blurRad="38100" dist="19050" dir="2700000" algn="tl" rotWithShape="0">
-                    <a:schemeClr val="dk1">
-                      <a:alpha val="40000"/>
-                    </a:schemeClr>
-                  </a:outerShdw>
-                </a:effectLst>
-              </a:rPr>
-              <a:t>3</a:t>
-            </a:r>
-          </a:p>
-        </p:txBody>
-      </p:sp>
-      <p:sp>
-        <p:nvSpPr>
-          <p:cNvPr id="19" name="TextBox 18"/>
-          <p:cNvSpPr txBox="1"/>
-          <p:nvPr/>
-        </p:nvSpPr>
-        <p:spPr>
-          <a:xfrm>
-            <a:off x="8903270" y="4690766"/>
-            <a:ext cx="390525" cy="333375"/>
-          </a:xfrm>
-          <a:prstGeom prst="rect">
-            <a:avLst/>
-          </a:prstGeom>
-          <a:ln>
-            <a:noFill/>
-          </a:ln>
-        </p:spPr>
-        <p:style>
-          <a:lnRef idx="2">
-            <a:schemeClr val="dk1"/>
-          </a:lnRef>
-          <a:fillRef idx="1">
-            <a:schemeClr val="lt1"/>
-          </a:fillRef>
-          <a:effectRef idx="0">
-            <a:schemeClr val="dk1"/>
-          </a:effectRef>
-          <a:fontRef idx="minor">
-            <a:schemeClr val="dk1"/>
-          </a:fontRef>
-        </p:style>
-        <p:txBody>
-          <a:bodyPr wrap="none" rtlCol="0">
-            <a:noAutofit/>
-          </a:bodyPr>
-          <a:lstStyle/>
-          <a:p>
-            <a:pPr algn="ctr"/>
-            <a:r>
-              <a:rPr lang="en-US" sz="1600" dirty="0" smtClean="0">
-                <a:ln w="0"/>
-                <a:effectLst>
-                  <a:outerShdw blurRad="38100" dist="19050" dir="2700000" algn="tl" rotWithShape="0">
-                    <a:schemeClr val="dk1">
-                      <a:alpha val="40000"/>
-                    </a:schemeClr>
-                  </a:outerShdw>
-                </a:effectLst>
-              </a:rPr>
-              <a:t>4</a:t>
-            </a:r>
-          </a:p>
-        </p:txBody>
-      </p:sp>
-      <p:sp>
-        <p:nvSpPr>
-          <p:cNvPr id="20" name="Rectangle 19"/>
-          <p:cNvSpPr/>
-          <p:nvPr/>
-        </p:nvSpPr>
-        <p:spPr bwMode="auto">
-          <a:xfrm>
-            <a:off x="7882044" y="4623265"/>
-            <a:ext cx="932121" cy="510363"/>
-          </a:xfrm>
-          <a:prstGeom prst="rect">
-            <a:avLst/>
-          </a:prstGeom>
-          <a:ln>
-            <a:headEnd/>
-            <a:tailEnd/>
-          </a:ln>
-        </p:spPr>
-        <p:style>
-          <a:lnRef idx="2">
-            <a:schemeClr val="dk1"/>
-          </a:lnRef>
-          <a:fillRef idx="1">
-            <a:schemeClr val="lt1"/>
-          </a:fillRef>
-          <a:effectRef idx="0">
-            <a:schemeClr val="dk1"/>
-          </a:effectRef>
-          <a:fontRef idx="minor">
-            <a:schemeClr val="dk1"/>
-          </a:fontRef>
-        </p:style>
-        <p:txBody>
-          <a:bodyPr wrap="none" rtlCol="0" anchor="ctr"/>
-          <a:lstStyle/>
-          <a:p>
-            <a:pPr algn="ctr"/>
-            <a:endParaRPr lang="en-US" sz="1600" dirty="0" smtClean="0">
-              <a:ln w="0"/>
-              <a:effectLst>
-                <a:outerShdw blurRad="38100" dist="19050" dir="2700000" algn="tl" rotWithShape="0">
-                  <a:schemeClr val="dk1">
-                    <a:alpha val="40000"/>
-                  </a:schemeClr>
-                </a:outerShdw>
-              </a:effectLst>
-              <a:latin typeface="+mn-lt"/>
-            </a:endParaRPr>
-          </a:p>
-        </p:txBody>
-      </p:sp>
-      <p:sp>
-        <p:nvSpPr>
-          <p:cNvPr id="21" name="Rectangle 20"/>
-          <p:cNvSpPr/>
-          <p:nvPr/>
-        </p:nvSpPr>
-        <p:spPr bwMode="auto">
-          <a:xfrm>
-            <a:off x="6074513" y="4623265"/>
-            <a:ext cx="932121" cy="510363"/>
-          </a:xfrm>
-          <a:prstGeom prst="rect">
-            <a:avLst/>
-          </a:prstGeom>
-          <a:ln>
-            <a:headEnd/>
-            <a:tailEnd/>
-          </a:ln>
-        </p:spPr>
-        <p:style>
-          <a:lnRef idx="2">
-            <a:schemeClr val="dk1"/>
-          </a:lnRef>
-          <a:fillRef idx="1">
-            <a:schemeClr val="lt1"/>
-          </a:fillRef>
-          <a:effectRef idx="0">
-            <a:schemeClr val="dk1"/>
-          </a:effectRef>
-          <a:fontRef idx="minor">
-            <a:schemeClr val="dk1"/>
-          </a:fontRef>
-        </p:style>
-        <p:txBody>
-          <a:bodyPr wrap="none" rtlCol="0" anchor="ctr"/>
-          <a:lstStyle/>
-          <a:p>
-            <a:pPr algn="ctr"/>
-            <a:endParaRPr lang="en-US" sz="1600" dirty="0" smtClean="0">
-              <a:ln w="0"/>
-              <a:effectLst>
-                <a:outerShdw blurRad="38100" dist="19050" dir="2700000" algn="tl" rotWithShape="0">
-                  <a:schemeClr val="dk1">
-                    <a:alpha val="40000"/>
-                  </a:schemeClr>
-                </a:outerShdw>
-              </a:effectLst>
-              <a:latin typeface="+mn-lt"/>
-            </a:endParaRPr>
-          </a:p>
-        </p:txBody>
-      </p:sp>
-      <p:sp>
-        <p:nvSpPr>
-          <p:cNvPr id="22" name="Rectangle 21"/>
-          <p:cNvSpPr/>
-          <p:nvPr/>
-        </p:nvSpPr>
-        <p:spPr bwMode="auto">
-          <a:xfrm>
-            <a:off x="4227218" y="4623265"/>
-            <a:ext cx="932121" cy="510363"/>
-          </a:xfrm>
-          <a:prstGeom prst="rect">
-            <a:avLst/>
-          </a:prstGeom>
-          <a:ln>
-            <a:headEnd/>
-            <a:tailEnd/>
-          </a:ln>
-        </p:spPr>
-        <p:style>
-          <a:lnRef idx="2">
-            <a:schemeClr val="dk1"/>
-          </a:lnRef>
-          <a:fillRef idx="1">
-            <a:schemeClr val="lt1"/>
-          </a:fillRef>
-          <a:effectRef idx="0">
-            <a:schemeClr val="dk1"/>
-          </a:effectRef>
-          <a:fontRef idx="minor">
-            <a:schemeClr val="dk1"/>
-          </a:fontRef>
-        </p:style>
-        <p:txBody>
-          <a:bodyPr wrap="none" rtlCol="0" anchor="ctr"/>
-          <a:lstStyle/>
-          <a:p>
-            <a:pPr algn="ctr"/>
-            <a:endParaRPr lang="en-US" sz="1600" dirty="0" smtClean="0">
-              <a:ln w="0"/>
-              <a:effectLst>
-                <a:outerShdw blurRad="38100" dist="19050" dir="2700000" algn="tl" rotWithShape="0">
-                  <a:schemeClr val="dk1">
-                    <a:alpha val="40000"/>
-                  </a:schemeClr>
-                </a:outerShdw>
-              </a:effectLst>
-              <a:latin typeface="+mn-lt"/>
-            </a:endParaRPr>
-          </a:p>
-        </p:txBody>
-      </p:sp>
-      <p:sp>
-        <p:nvSpPr>
-          <p:cNvPr id="23" name="Rectangle 22"/>
-          <p:cNvSpPr/>
-          <p:nvPr/>
-        </p:nvSpPr>
-        <p:spPr bwMode="auto">
-          <a:xfrm>
-            <a:off x="2360538" y="4623265"/>
-            <a:ext cx="932121" cy="510363"/>
-          </a:xfrm>
-          <a:prstGeom prst="rect">
-            <a:avLst/>
-          </a:prstGeom>
-          <a:ln>
-            <a:headEnd/>
-            <a:tailEnd/>
-          </a:ln>
-        </p:spPr>
-        <p:style>
-          <a:lnRef idx="2">
-            <a:schemeClr val="dk1"/>
-          </a:lnRef>
-          <a:fillRef idx="1">
-            <a:schemeClr val="lt1"/>
-          </a:fillRef>
-          <a:effectRef idx="0">
-            <a:schemeClr val="dk1"/>
-          </a:effectRef>
-          <a:fontRef idx="minor">
-            <a:schemeClr val="dk1"/>
-          </a:fontRef>
-        </p:style>
-        <p:txBody>
-          <a:bodyPr wrap="none" rtlCol="0" anchor="ctr"/>
-          <a:lstStyle/>
-          <a:p>
-            <a:pPr algn="ctr"/>
-            <a:endParaRPr lang="en-US" sz="1600" dirty="0" smtClean="0">
-              <a:ln w="0"/>
-              <a:effectLst>
-                <a:outerShdw blurRad="38100" dist="19050" dir="2700000" algn="tl" rotWithShape="0">
-                  <a:schemeClr val="dk1">
-                    <a:alpha val="40000"/>
-                  </a:schemeClr>
-                </a:outerShdw>
-              </a:effectLst>
-              <a:latin typeface="+mn-lt"/>
-            </a:endParaRPr>
-          </a:p>
-        </p:txBody>
-      </p:sp>
-      <p:sp>
-        <p:nvSpPr>
-          <p:cNvPr id="24" name="TextBox 23"/>
-          <p:cNvSpPr txBox="1"/>
-          <p:nvPr/>
-        </p:nvSpPr>
-        <p:spPr>
-          <a:xfrm>
-            <a:off x="2620152" y="4690766"/>
-            <a:ext cx="409575" cy="342900"/>
-          </a:xfrm>
-          <a:prstGeom prst="rect">
-            <a:avLst/>
-          </a:prstGeom>
-          <a:ln>
-            <a:noFill/>
-          </a:ln>
-        </p:spPr>
-        <p:style>
-          <a:lnRef idx="2">
-            <a:schemeClr val="dk1"/>
-          </a:lnRef>
-          <a:fillRef idx="1">
-            <a:schemeClr val="lt1"/>
-          </a:fillRef>
-          <a:effectRef idx="0">
-            <a:schemeClr val="dk1"/>
-          </a:effectRef>
-          <a:fontRef idx="minor">
-            <a:schemeClr val="dk1"/>
-          </a:fontRef>
-        </p:style>
-        <p:txBody>
-          <a:bodyPr wrap="none" rtlCol="0">
-            <a:noAutofit/>
-          </a:bodyPr>
-          <a:lstStyle/>
-          <a:p>
-            <a:pPr algn="ctr"/>
-            <a:r>
-              <a:rPr lang="en-US" sz="1600" dirty="0" smtClean="0">
-                <a:ln w="0"/>
-                <a:effectLst>
-                  <a:outerShdw blurRad="38100" dist="19050" dir="2700000" algn="tl" rotWithShape="0">
-                    <a:schemeClr val="dk1">
-                      <a:alpha val="40000"/>
-                    </a:schemeClr>
-                  </a:outerShdw>
-                </a:effectLst>
-              </a:rPr>
-              <a:t>BG</a:t>
-            </a:r>
-          </a:p>
-        </p:txBody>
-      </p:sp>
-      <p:sp>
-        <p:nvSpPr>
-          <p:cNvPr id="25" name="TextBox 24"/>
-          <p:cNvSpPr txBox="1"/>
-          <p:nvPr/>
-        </p:nvSpPr>
-        <p:spPr>
-          <a:xfrm>
-            <a:off x="4506045" y="4690766"/>
-            <a:ext cx="409575" cy="342900"/>
-          </a:xfrm>
-          <a:prstGeom prst="rect">
-            <a:avLst/>
-          </a:prstGeom>
-          <a:ln>
-            <a:noFill/>
-          </a:ln>
-        </p:spPr>
-        <p:style>
-          <a:lnRef idx="2">
-            <a:schemeClr val="dk1"/>
-          </a:lnRef>
-          <a:fillRef idx="1">
-            <a:schemeClr val="lt1"/>
-          </a:fillRef>
-          <a:effectRef idx="0">
-            <a:schemeClr val="dk1"/>
-          </a:effectRef>
-          <a:fontRef idx="minor">
-            <a:schemeClr val="dk1"/>
-          </a:fontRef>
-        </p:style>
-        <p:txBody>
-          <a:bodyPr wrap="none" rtlCol="0">
-            <a:noAutofit/>
-          </a:bodyPr>
-          <a:lstStyle/>
-          <a:p>
-            <a:pPr algn="ctr"/>
-            <a:r>
-              <a:rPr lang="en-US" sz="1600" dirty="0" smtClean="0">
-                <a:ln w="0"/>
-                <a:effectLst>
-                  <a:outerShdw blurRad="38100" dist="19050" dir="2700000" algn="tl" rotWithShape="0">
-                    <a:schemeClr val="dk1">
-                      <a:alpha val="40000"/>
-                    </a:schemeClr>
-                  </a:outerShdw>
-                </a:effectLst>
-              </a:rPr>
-              <a:t>BG</a:t>
-            </a:r>
-          </a:p>
-        </p:txBody>
-      </p:sp>
-      <p:sp>
-        <p:nvSpPr>
-          <p:cNvPr id="26" name="TextBox 25"/>
-          <p:cNvSpPr txBox="1"/>
-          <p:nvPr/>
-        </p:nvSpPr>
-        <p:spPr>
-          <a:xfrm>
-            <a:off x="6334014" y="4690766"/>
-            <a:ext cx="409575" cy="342900"/>
-          </a:xfrm>
-          <a:prstGeom prst="rect">
-            <a:avLst/>
-          </a:prstGeom>
-          <a:ln>
-            <a:noFill/>
-          </a:ln>
-        </p:spPr>
-        <p:style>
-          <a:lnRef idx="2">
-            <a:schemeClr val="dk1"/>
-          </a:lnRef>
-          <a:fillRef idx="1">
-            <a:schemeClr val="lt1"/>
-          </a:fillRef>
-          <a:effectRef idx="0">
-            <a:schemeClr val="dk1"/>
-          </a:effectRef>
-          <a:fontRef idx="minor">
-            <a:schemeClr val="dk1"/>
-          </a:fontRef>
-        </p:style>
-        <p:txBody>
-          <a:bodyPr wrap="none" rtlCol="0">
-            <a:noAutofit/>
-          </a:bodyPr>
-          <a:lstStyle/>
-          <a:p>
-            <a:pPr algn="ctr"/>
-            <a:r>
-              <a:rPr lang="en-US" sz="1600" dirty="0" smtClean="0">
-                <a:ln w="0"/>
-                <a:effectLst>
-                  <a:outerShdw blurRad="38100" dist="19050" dir="2700000" algn="tl" rotWithShape="0">
-                    <a:schemeClr val="dk1">
-                      <a:alpha val="40000"/>
-                    </a:schemeClr>
-                  </a:outerShdw>
-                </a:effectLst>
-              </a:rPr>
-              <a:t>BG</a:t>
-            </a:r>
-          </a:p>
-        </p:txBody>
-      </p:sp>
-      <p:sp>
-        <p:nvSpPr>
-          <p:cNvPr id="27" name="TextBox 26"/>
-          <p:cNvSpPr txBox="1"/>
-          <p:nvPr/>
-        </p:nvSpPr>
-        <p:spPr>
-          <a:xfrm>
-            <a:off x="8152843" y="4690766"/>
-            <a:ext cx="409575" cy="342900"/>
-          </a:xfrm>
-          <a:prstGeom prst="rect">
-            <a:avLst/>
-          </a:prstGeom>
-          <a:ln>
-            <a:noFill/>
-          </a:ln>
-        </p:spPr>
-        <p:style>
-          <a:lnRef idx="2">
-            <a:schemeClr val="dk1"/>
-          </a:lnRef>
-          <a:fillRef idx="1">
-            <a:schemeClr val="lt1"/>
-          </a:fillRef>
-          <a:effectRef idx="0">
-            <a:schemeClr val="dk1"/>
-          </a:effectRef>
-          <a:fontRef idx="minor">
-            <a:schemeClr val="dk1"/>
-          </a:fontRef>
-        </p:style>
-        <p:txBody>
-          <a:bodyPr wrap="none" rtlCol="0">
-            <a:noAutofit/>
-          </a:bodyPr>
-          <a:lstStyle/>
-          <a:p>
-            <a:pPr algn="ctr"/>
-            <a:r>
-              <a:rPr lang="en-US" sz="1600" dirty="0" smtClean="0">
-                <a:ln w="0"/>
-                <a:effectLst>
-                  <a:outerShdw blurRad="38100" dist="19050" dir="2700000" algn="tl" rotWithShape="0">
-                    <a:schemeClr val="dk1">
-                      <a:alpha val="40000"/>
-                    </a:schemeClr>
-                  </a:outerShdw>
-                </a:effectLst>
-              </a:rPr>
-              <a:t>BG</a:t>
-            </a:r>
-          </a:p>
-        </p:txBody>
-      </p:sp>
-      <p:sp>
-        <p:nvSpPr>
-          <p:cNvPr id="32" name="Rectangle 31"/>
-          <p:cNvSpPr/>
-          <p:nvPr/>
-        </p:nvSpPr>
-        <p:spPr bwMode="auto">
-          <a:xfrm>
-            <a:off x="6353243" y="1612358"/>
-            <a:ext cx="932121" cy="510363"/>
-          </a:xfrm>
-          <a:prstGeom prst="rect">
-            <a:avLst/>
-          </a:prstGeom>
-          <a:pattFill prst="wdUpDiag">
-            <a:fgClr>
-              <a:schemeClr val="tx1"/>
-            </a:fgClr>
-            <a:bgClr>
-              <a:schemeClr val="bg1"/>
-            </a:bgClr>
-          </a:pattFill>
-          <a:ln>
-            <a:headEnd/>
-            <a:tailEnd/>
-          </a:ln>
-        </p:spPr>
-        <p:style>
-          <a:lnRef idx="2">
-            <a:schemeClr val="dk1"/>
-          </a:lnRef>
-          <a:fillRef idx="1">
-            <a:schemeClr val="lt1"/>
-          </a:fillRef>
-          <a:effectRef idx="0">
-            <a:schemeClr val="dk1"/>
-          </a:effectRef>
-          <a:fontRef idx="minor">
-            <a:schemeClr val="dk1"/>
-          </a:fontRef>
-        </p:style>
-        <p:txBody>
-          <a:bodyPr wrap="none" rtlCol="0" anchor="ctr"/>
-          <a:lstStyle/>
-          <a:p>
-            <a:pPr algn="ctr"/>
-            <a:endParaRPr lang="en-US" sz="1600" dirty="0" smtClean="0">
-              <a:ln w="0"/>
-              <a:effectLst>
-                <a:outerShdw blurRad="38100" dist="19050" dir="2700000" algn="tl" rotWithShape="0">
-                  <a:schemeClr val="dk1">
-                    <a:alpha val="40000"/>
-                  </a:schemeClr>
-                </a:outerShdw>
-              </a:effectLst>
-              <a:latin typeface="+mn-lt"/>
-            </a:endParaRPr>
-          </a:p>
-        </p:txBody>
-      </p:sp>
-      <p:sp>
-        <p:nvSpPr>
-          <p:cNvPr id="33" name="Rectangle 32"/>
-          <p:cNvSpPr/>
-          <p:nvPr/>
-        </p:nvSpPr>
-        <p:spPr bwMode="auto">
-          <a:xfrm>
-            <a:off x="6353132" y="2192705"/>
-            <a:ext cx="932121" cy="510363"/>
-          </a:xfrm>
-          <a:prstGeom prst="rect">
-            <a:avLst/>
-          </a:prstGeom>
-          <a:ln>
-            <a:headEnd/>
-            <a:tailEnd/>
-          </a:ln>
-        </p:spPr>
-        <p:style>
-          <a:lnRef idx="2">
-            <a:schemeClr val="dk1"/>
-          </a:lnRef>
-          <a:fillRef idx="1">
-            <a:schemeClr val="lt1"/>
-          </a:fillRef>
-          <a:effectRef idx="0">
-            <a:schemeClr val="dk1"/>
-          </a:effectRef>
-          <a:fontRef idx="minor">
-            <a:schemeClr val="dk1"/>
-          </a:fontRef>
-        </p:style>
-        <p:txBody>
-          <a:bodyPr wrap="none" rtlCol="0" anchor="ctr"/>
-          <a:lstStyle/>
-          <a:p>
-            <a:pPr algn="ctr"/>
-            <a:endParaRPr lang="en-US" sz="1600" dirty="0" smtClean="0">
-              <a:ln w="0"/>
-              <a:effectLst>
-                <a:outerShdw blurRad="38100" dist="19050" dir="2700000" algn="tl" rotWithShape="0">
-                  <a:schemeClr val="dk1">
-                    <a:alpha val="40000"/>
-                  </a:schemeClr>
-                </a:outerShdw>
-              </a:effectLst>
-              <a:latin typeface="+mn-lt"/>
-            </a:endParaRPr>
-          </a:p>
-        </p:txBody>
-      </p:sp>
-      <p:sp>
-        <p:nvSpPr>
-          <p:cNvPr id="34" name="TextBox 33"/>
-          <p:cNvSpPr txBox="1"/>
-          <p:nvPr/>
-        </p:nvSpPr>
-        <p:spPr>
-          <a:xfrm>
-            <a:off x="7420340" y="1675858"/>
-            <a:ext cx="2015760" cy="414879"/>
-          </a:xfrm>
-          <a:prstGeom prst="rect">
-            <a:avLst/>
-          </a:prstGeom>
-        </p:spPr>
-        <p:style>
-          <a:lnRef idx="2">
-            <a:schemeClr val="dk1"/>
-          </a:lnRef>
-          <a:fillRef idx="1">
-            <a:schemeClr val="lt1"/>
-          </a:fillRef>
-          <a:effectRef idx="0">
-            <a:schemeClr val="dk1"/>
-          </a:effectRef>
-          <a:fontRef idx="minor">
-            <a:schemeClr val="dk1"/>
-          </a:fontRef>
-        </p:style>
-        <p:txBody>
-          <a:bodyPr wrap="none" rtlCol="0">
-            <a:noAutofit/>
-          </a:bodyPr>
-          <a:lstStyle/>
-          <a:p>
-            <a:r>
-              <a:rPr lang="en-US" sz="1600" dirty="0" smtClean="0">
-                <a:ln w="0"/>
-                <a:effectLst>
-                  <a:outerShdw blurRad="38100" dist="19050" dir="2700000" algn="tl" rotWithShape="0">
-                    <a:schemeClr val="dk1">
-                      <a:alpha val="40000"/>
-                    </a:schemeClr>
-                  </a:outerShdw>
-                </a:effectLst>
-              </a:rPr>
-              <a:t>Activity block (AB)</a:t>
-            </a:r>
-          </a:p>
-          <a:p>
-            <a:pPr algn="ctr"/>
-            <a:endParaRPr lang="en-US" sz="1600" dirty="0" smtClean="0">
-              <a:ln w="0"/>
-              <a:effectLst>
-                <a:outerShdw blurRad="38100" dist="19050" dir="2700000" algn="tl" rotWithShape="0">
-                  <a:schemeClr val="dk1">
-                    <a:alpha val="40000"/>
-                  </a:schemeClr>
-                </a:outerShdw>
-              </a:effectLst>
-            </a:endParaRPr>
-          </a:p>
-        </p:txBody>
-      </p:sp>
-      <p:sp>
-        <p:nvSpPr>
-          <p:cNvPr id="35" name="TextBox 34"/>
-          <p:cNvSpPr txBox="1"/>
-          <p:nvPr/>
-        </p:nvSpPr>
-        <p:spPr>
-          <a:xfrm>
-            <a:off x="7420340" y="2281088"/>
-            <a:ext cx="2015760" cy="364364"/>
-          </a:xfrm>
-          <a:prstGeom prst="rect">
-            <a:avLst/>
-          </a:prstGeom>
-        </p:spPr>
-        <p:style>
-          <a:lnRef idx="2">
-            <a:schemeClr val="dk1"/>
-          </a:lnRef>
-          <a:fillRef idx="1">
-            <a:schemeClr val="lt1"/>
-          </a:fillRef>
-          <a:effectRef idx="0">
-            <a:schemeClr val="dk1"/>
-          </a:effectRef>
-          <a:fontRef idx="minor">
-            <a:schemeClr val="dk1"/>
-          </a:fontRef>
-        </p:style>
-        <p:txBody>
-          <a:bodyPr wrap="none" rtlCol="0">
-            <a:noAutofit/>
-          </a:bodyPr>
-          <a:lstStyle/>
-          <a:p>
-            <a:r>
-              <a:rPr lang="en-US" sz="1600" dirty="0">
-                <a:ln w="0"/>
-                <a:effectLst>
-                  <a:outerShdw blurRad="38100" dist="19050" dir="2700000" algn="tl" rotWithShape="0">
-                    <a:schemeClr val="dk1">
-                      <a:alpha val="40000"/>
-                    </a:schemeClr>
-                  </a:outerShdw>
-                </a:effectLst>
-              </a:rPr>
-              <a:t>Background </a:t>
-            </a:r>
-            <a:r>
-              <a:rPr lang="en-US" sz="1600" dirty="0" smtClean="0">
-                <a:ln w="0"/>
-                <a:effectLst>
-                  <a:outerShdw blurRad="38100" dist="19050" dir="2700000" algn="tl" rotWithShape="0">
-                    <a:schemeClr val="dk1">
-                      <a:alpha val="40000"/>
-                    </a:schemeClr>
-                  </a:outerShdw>
-                </a:effectLst>
-              </a:rPr>
-              <a:t>block (BG)</a:t>
-            </a:r>
-            <a:endParaRPr lang="en-US" sz="1600" dirty="0">
-              <a:ln w="0"/>
-              <a:effectLst>
-                <a:outerShdw blurRad="38100" dist="19050" dir="2700000" algn="tl" rotWithShape="0">
-                  <a:schemeClr val="dk1">
-                    <a:alpha val="40000"/>
-                  </a:schemeClr>
-                </a:outerShdw>
-              </a:effectLst>
-            </a:endParaRPr>
-          </a:p>
-          <a:p>
-            <a:pPr algn="ctr"/>
-            <a:endParaRPr lang="en-US" sz="1600" dirty="0" err="1" smtClean="0">
-              <a:ln w="0"/>
-              <a:effectLst>
-                <a:outerShdw blurRad="38100" dist="19050" dir="2700000" algn="tl" rotWithShape="0">
-                  <a:schemeClr val="dk1">
-                    <a:alpha val="40000"/>
-                  </a:schemeClr>
-                </a:outerShdw>
-              </a:effectLst>
-            </a:endParaRPr>
-          </a:p>
-        </p:txBody>
-      </p:sp>
-    </p:spTree>
-    <p:extLst>
-      <p:ext uri="{BB962C8B-B14F-4D97-AF65-F5344CB8AC3E}">
-        <p14:creationId xmlns:p14="http://schemas.microsoft.com/office/powerpoint/2010/main" val="2021139539"/>
       </p:ext>
     </p:extLst>
   </p:cSld>

</xml_diff>